<commit_message>
instruction screens update & folder cleanup
</commit_message>
<xml_diff>
--- a/instructions/Instruction.pptx
+++ b/instructions/Instruction.pptx
@@ -135,6 +135,10 @@
 </p:presentation>
 </file>
 
+<file path=ppt/revisionInfo.xml><?xml version="1.0" encoding="utf-8"?>
+<p1510:revInfo xmlns:a="http://schemas.openxmlformats.org/drawingml/2006/main" xmlns:r="http://schemas.openxmlformats.org/officeDocument/2006/relationships" xmlns:p1510="http://schemas.microsoft.com/office/powerpoint/2015/10/main"/>
+</file>
+
 <file path=ppt/slideLayouts/slideLayout1.xml><?xml version="1.0" encoding="utf-8"?>
 <p:sldLayout xmlns:a="http://schemas.openxmlformats.org/drawingml/2006/main" xmlns:r="http://schemas.openxmlformats.org/officeDocument/2006/relationships" xmlns:p="http://schemas.openxmlformats.org/presentationml/2006/main" type="title" preserve="1">
   <p:cSld name="Title Slide">
@@ -173,10 +177,9 @@
           <a:lstStyle/>
           <a:p>
             <a:r>
-              <a:rPr lang="en-US" smtClean="0"/>
+              <a:rPr lang="en-US"/>
               <a:t>Click to edit Master title style</a:t>
             </a:r>
-            <a:endParaRPr lang="en-US"/>
           </a:p>
         </p:txBody>
       </p:sp>
@@ -292,10 +295,9 @@
           </a:lstStyle>
           <a:p>
             <a:r>
-              <a:rPr lang="en-US" smtClean="0"/>
+              <a:rPr lang="en-US"/>
               <a:t>Click to edit Master subtitle style</a:t>
             </a:r>
-            <a:endParaRPr lang="en-US"/>
           </a:p>
         </p:txBody>
       </p:sp>
@@ -316,7 +318,7 @@
           <a:p>
             <a:fld id="{AE0E4962-4B55-4324-B1D8-080E85B5A118}" type="datetimeFigureOut">
               <a:rPr lang="en-US" smtClean="0"/>
-              <a:t>1/15/2016</a:t>
+              <a:t>8/31/2018</a:t>
             </a:fld>
             <a:endParaRPr lang="en-US"/>
           </a:p>
@@ -410,10 +412,9 @@
           <a:lstStyle/>
           <a:p>
             <a:r>
-              <a:rPr lang="en-US" smtClean="0"/>
+              <a:rPr lang="en-US"/>
               <a:t>Click to edit Master title style</a:t>
             </a:r>
-            <a:endParaRPr lang="en-US"/>
           </a:p>
         </p:txBody>
       </p:sp>
@@ -434,38 +435,37 @@
           <a:p>
             <a:pPr lvl="0"/>
             <a:r>
-              <a:rPr lang="en-US" smtClean="0"/>
+              <a:rPr lang="en-US"/>
               <a:t>Click to edit Master text styles</a:t>
             </a:r>
           </a:p>
           <a:p>
             <a:pPr lvl="1"/>
             <a:r>
-              <a:rPr lang="en-US" smtClean="0"/>
+              <a:rPr lang="en-US"/>
               <a:t>Second level</a:t>
             </a:r>
           </a:p>
           <a:p>
             <a:pPr lvl="2"/>
             <a:r>
-              <a:rPr lang="en-US" smtClean="0"/>
+              <a:rPr lang="en-US"/>
               <a:t>Third level</a:t>
             </a:r>
           </a:p>
           <a:p>
             <a:pPr lvl="3"/>
             <a:r>
-              <a:rPr lang="en-US" smtClean="0"/>
+              <a:rPr lang="en-US"/>
               <a:t>Fourth level</a:t>
             </a:r>
           </a:p>
           <a:p>
             <a:pPr lvl="4"/>
             <a:r>
-              <a:rPr lang="en-US" smtClean="0"/>
+              <a:rPr lang="en-US"/>
               <a:t>Fifth level</a:t>
             </a:r>
-            <a:endParaRPr lang="en-US"/>
           </a:p>
         </p:txBody>
       </p:sp>
@@ -486,7 +486,7 @@
           <a:p>
             <a:fld id="{AE0E4962-4B55-4324-B1D8-080E85B5A118}" type="datetimeFigureOut">
               <a:rPr lang="en-US" smtClean="0"/>
-              <a:t>1/15/2016</a:t>
+              <a:t>8/31/2018</a:t>
             </a:fld>
             <a:endParaRPr lang="en-US"/>
           </a:p>
@@ -585,10 +585,9 @@
           <a:lstStyle/>
           <a:p>
             <a:r>
-              <a:rPr lang="en-US" smtClean="0"/>
+              <a:rPr lang="en-US"/>
               <a:t>Click to edit Master title style</a:t>
             </a:r>
-            <a:endParaRPr lang="en-US"/>
           </a:p>
         </p:txBody>
       </p:sp>
@@ -614,38 +613,37 @@
           <a:p>
             <a:pPr lvl="0"/>
             <a:r>
-              <a:rPr lang="en-US" smtClean="0"/>
+              <a:rPr lang="en-US"/>
               <a:t>Click to edit Master text styles</a:t>
             </a:r>
           </a:p>
           <a:p>
             <a:pPr lvl="1"/>
             <a:r>
-              <a:rPr lang="en-US" smtClean="0"/>
+              <a:rPr lang="en-US"/>
               <a:t>Second level</a:t>
             </a:r>
           </a:p>
           <a:p>
             <a:pPr lvl="2"/>
             <a:r>
-              <a:rPr lang="en-US" smtClean="0"/>
+              <a:rPr lang="en-US"/>
               <a:t>Third level</a:t>
             </a:r>
           </a:p>
           <a:p>
             <a:pPr lvl="3"/>
             <a:r>
-              <a:rPr lang="en-US" smtClean="0"/>
+              <a:rPr lang="en-US"/>
               <a:t>Fourth level</a:t>
             </a:r>
           </a:p>
           <a:p>
             <a:pPr lvl="4"/>
             <a:r>
-              <a:rPr lang="en-US" smtClean="0"/>
+              <a:rPr lang="en-US"/>
               <a:t>Fifth level</a:t>
             </a:r>
-            <a:endParaRPr lang="en-US"/>
           </a:p>
         </p:txBody>
       </p:sp>
@@ -666,7 +664,7 @@
           <a:p>
             <a:fld id="{AE0E4962-4B55-4324-B1D8-080E85B5A118}" type="datetimeFigureOut">
               <a:rPr lang="en-US" smtClean="0"/>
-              <a:t>1/15/2016</a:t>
+              <a:t>8/31/2018</a:t>
             </a:fld>
             <a:endParaRPr lang="en-US"/>
           </a:p>
@@ -760,10 +758,9 @@
           <a:lstStyle/>
           <a:p>
             <a:r>
-              <a:rPr lang="en-US" smtClean="0"/>
+              <a:rPr lang="en-US"/>
               <a:t>Click to edit Master title style</a:t>
             </a:r>
-            <a:endParaRPr lang="en-US"/>
           </a:p>
         </p:txBody>
       </p:sp>
@@ -784,38 +781,37 @@
           <a:p>
             <a:pPr lvl="0"/>
             <a:r>
-              <a:rPr lang="en-US" smtClean="0"/>
+              <a:rPr lang="en-US"/>
               <a:t>Click to edit Master text styles</a:t>
             </a:r>
           </a:p>
           <a:p>
             <a:pPr lvl="1"/>
             <a:r>
-              <a:rPr lang="en-US" smtClean="0"/>
+              <a:rPr lang="en-US"/>
               <a:t>Second level</a:t>
             </a:r>
           </a:p>
           <a:p>
             <a:pPr lvl="2"/>
             <a:r>
-              <a:rPr lang="en-US" smtClean="0"/>
+              <a:rPr lang="en-US"/>
               <a:t>Third level</a:t>
             </a:r>
           </a:p>
           <a:p>
             <a:pPr lvl="3"/>
             <a:r>
-              <a:rPr lang="en-US" smtClean="0"/>
+              <a:rPr lang="en-US"/>
               <a:t>Fourth level</a:t>
             </a:r>
           </a:p>
           <a:p>
             <a:pPr lvl="4"/>
             <a:r>
-              <a:rPr lang="en-US" smtClean="0"/>
+              <a:rPr lang="en-US"/>
               <a:t>Fifth level</a:t>
             </a:r>
-            <a:endParaRPr lang="en-US"/>
           </a:p>
         </p:txBody>
       </p:sp>
@@ -836,7 +832,7 @@
           <a:p>
             <a:fld id="{AE0E4962-4B55-4324-B1D8-080E85B5A118}" type="datetimeFigureOut">
               <a:rPr lang="en-US" smtClean="0"/>
-              <a:t>1/15/2016</a:t>
+              <a:t>8/31/2018</a:t>
             </a:fld>
             <a:endParaRPr lang="en-US"/>
           </a:p>
@@ -939,10 +935,9 @@
           </a:lstStyle>
           <a:p>
             <a:r>
-              <a:rPr lang="en-US" smtClean="0"/>
+              <a:rPr lang="en-US"/>
               <a:t>Click to edit Master title style</a:t>
             </a:r>
-            <a:endParaRPr lang="en-US"/>
           </a:p>
         </p:txBody>
       </p:sp>
@@ -1059,7 +1054,7 @@
           <a:p>
             <a:pPr lvl="0"/>
             <a:r>
-              <a:rPr lang="en-US" smtClean="0"/>
+              <a:rPr lang="en-US"/>
               <a:t>Click to edit Master text styles</a:t>
             </a:r>
           </a:p>
@@ -1082,7 +1077,7 @@
           <a:p>
             <a:fld id="{AE0E4962-4B55-4324-B1D8-080E85B5A118}" type="datetimeFigureOut">
               <a:rPr lang="en-US" smtClean="0"/>
-              <a:t>1/15/2016</a:t>
+              <a:t>8/31/2018</a:t>
             </a:fld>
             <a:endParaRPr lang="en-US"/>
           </a:p>
@@ -1176,10 +1171,9 @@
           <a:lstStyle/>
           <a:p>
             <a:r>
-              <a:rPr lang="en-US" smtClean="0"/>
+              <a:rPr lang="en-US"/>
               <a:t>Click to edit Master title style</a:t>
             </a:r>
-            <a:endParaRPr lang="en-US"/>
           </a:p>
         </p:txBody>
       </p:sp>
@@ -1233,38 +1227,37 @@
           <a:p>
             <a:pPr lvl="0"/>
             <a:r>
-              <a:rPr lang="en-US" smtClean="0"/>
+              <a:rPr lang="en-US"/>
               <a:t>Click to edit Master text styles</a:t>
             </a:r>
           </a:p>
           <a:p>
             <a:pPr lvl="1"/>
             <a:r>
-              <a:rPr lang="en-US" smtClean="0"/>
+              <a:rPr lang="en-US"/>
               <a:t>Second level</a:t>
             </a:r>
           </a:p>
           <a:p>
             <a:pPr lvl="2"/>
             <a:r>
-              <a:rPr lang="en-US" smtClean="0"/>
+              <a:rPr lang="en-US"/>
               <a:t>Third level</a:t>
             </a:r>
           </a:p>
           <a:p>
             <a:pPr lvl="3"/>
             <a:r>
-              <a:rPr lang="en-US" smtClean="0"/>
+              <a:rPr lang="en-US"/>
               <a:t>Fourth level</a:t>
             </a:r>
           </a:p>
           <a:p>
             <a:pPr lvl="4"/>
             <a:r>
-              <a:rPr lang="en-US" smtClean="0"/>
+              <a:rPr lang="en-US"/>
               <a:t>Fifth level</a:t>
             </a:r>
-            <a:endParaRPr lang="en-US"/>
           </a:p>
         </p:txBody>
       </p:sp>
@@ -1318,38 +1311,37 @@
           <a:p>
             <a:pPr lvl="0"/>
             <a:r>
-              <a:rPr lang="en-US" smtClean="0"/>
+              <a:rPr lang="en-US"/>
               <a:t>Click to edit Master text styles</a:t>
             </a:r>
           </a:p>
           <a:p>
             <a:pPr lvl="1"/>
             <a:r>
-              <a:rPr lang="en-US" smtClean="0"/>
+              <a:rPr lang="en-US"/>
               <a:t>Second level</a:t>
             </a:r>
           </a:p>
           <a:p>
             <a:pPr lvl="2"/>
             <a:r>
-              <a:rPr lang="en-US" smtClean="0"/>
+              <a:rPr lang="en-US"/>
               <a:t>Third level</a:t>
             </a:r>
           </a:p>
           <a:p>
             <a:pPr lvl="3"/>
             <a:r>
-              <a:rPr lang="en-US" smtClean="0"/>
+              <a:rPr lang="en-US"/>
               <a:t>Fourth level</a:t>
             </a:r>
           </a:p>
           <a:p>
             <a:pPr lvl="4"/>
             <a:r>
-              <a:rPr lang="en-US" smtClean="0"/>
+              <a:rPr lang="en-US"/>
               <a:t>Fifth level</a:t>
             </a:r>
-            <a:endParaRPr lang="en-US"/>
           </a:p>
         </p:txBody>
       </p:sp>
@@ -1370,7 +1362,7 @@
           <a:p>
             <a:fld id="{AE0E4962-4B55-4324-B1D8-080E85B5A118}" type="datetimeFigureOut">
               <a:rPr lang="en-US" smtClean="0"/>
-              <a:t>1/15/2016</a:t>
+              <a:t>8/31/2018</a:t>
             </a:fld>
             <a:endParaRPr lang="en-US"/>
           </a:p>
@@ -1468,10 +1460,9 @@
           </a:lstStyle>
           <a:p>
             <a:r>
-              <a:rPr lang="en-US" smtClean="0"/>
+              <a:rPr lang="en-US"/>
               <a:t>Click to edit Master title style</a:t>
             </a:r>
-            <a:endParaRPr lang="en-US"/>
           </a:p>
         </p:txBody>
       </p:sp>
@@ -1534,7 +1525,7 @@
           <a:p>
             <a:pPr lvl="0"/>
             <a:r>
-              <a:rPr lang="en-US" smtClean="0"/>
+              <a:rPr lang="en-US"/>
               <a:t>Click to edit Master text styles</a:t>
             </a:r>
           </a:p>
@@ -1590,38 +1581,37 @@
           <a:p>
             <a:pPr lvl="0"/>
             <a:r>
-              <a:rPr lang="en-US" smtClean="0"/>
+              <a:rPr lang="en-US"/>
               <a:t>Click to edit Master text styles</a:t>
             </a:r>
           </a:p>
           <a:p>
             <a:pPr lvl="1"/>
             <a:r>
-              <a:rPr lang="en-US" smtClean="0"/>
+              <a:rPr lang="en-US"/>
               <a:t>Second level</a:t>
             </a:r>
           </a:p>
           <a:p>
             <a:pPr lvl="2"/>
             <a:r>
-              <a:rPr lang="en-US" smtClean="0"/>
+              <a:rPr lang="en-US"/>
               <a:t>Third level</a:t>
             </a:r>
           </a:p>
           <a:p>
             <a:pPr lvl="3"/>
             <a:r>
-              <a:rPr lang="en-US" smtClean="0"/>
+              <a:rPr lang="en-US"/>
               <a:t>Fourth level</a:t>
             </a:r>
           </a:p>
           <a:p>
             <a:pPr lvl="4"/>
             <a:r>
-              <a:rPr lang="en-US" smtClean="0"/>
+              <a:rPr lang="en-US"/>
               <a:t>Fifth level</a:t>
             </a:r>
-            <a:endParaRPr lang="en-US"/>
           </a:p>
         </p:txBody>
       </p:sp>
@@ -1684,7 +1674,7 @@
           <a:p>
             <a:pPr lvl="0"/>
             <a:r>
-              <a:rPr lang="en-US" smtClean="0"/>
+              <a:rPr lang="en-US"/>
               <a:t>Click to edit Master text styles</a:t>
             </a:r>
           </a:p>
@@ -1740,38 +1730,37 @@
           <a:p>
             <a:pPr lvl="0"/>
             <a:r>
-              <a:rPr lang="en-US" smtClean="0"/>
+              <a:rPr lang="en-US"/>
               <a:t>Click to edit Master text styles</a:t>
             </a:r>
           </a:p>
           <a:p>
             <a:pPr lvl="1"/>
             <a:r>
-              <a:rPr lang="en-US" smtClean="0"/>
+              <a:rPr lang="en-US"/>
               <a:t>Second level</a:t>
             </a:r>
           </a:p>
           <a:p>
             <a:pPr lvl="2"/>
             <a:r>
-              <a:rPr lang="en-US" smtClean="0"/>
+              <a:rPr lang="en-US"/>
               <a:t>Third level</a:t>
             </a:r>
           </a:p>
           <a:p>
             <a:pPr lvl="3"/>
             <a:r>
-              <a:rPr lang="en-US" smtClean="0"/>
+              <a:rPr lang="en-US"/>
               <a:t>Fourth level</a:t>
             </a:r>
           </a:p>
           <a:p>
             <a:pPr lvl="4"/>
             <a:r>
-              <a:rPr lang="en-US" smtClean="0"/>
+              <a:rPr lang="en-US"/>
               <a:t>Fifth level</a:t>
             </a:r>
-            <a:endParaRPr lang="en-US"/>
           </a:p>
         </p:txBody>
       </p:sp>
@@ -1792,7 +1781,7 @@
           <a:p>
             <a:fld id="{AE0E4962-4B55-4324-B1D8-080E85B5A118}" type="datetimeFigureOut">
               <a:rPr lang="en-US" smtClean="0"/>
-              <a:t>1/15/2016</a:t>
+              <a:t>8/31/2018</a:t>
             </a:fld>
             <a:endParaRPr lang="en-US"/>
           </a:p>
@@ -1886,10 +1875,9 @@
           <a:lstStyle/>
           <a:p>
             <a:r>
-              <a:rPr lang="en-US" smtClean="0"/>
+              <a:rPr lang="en-US"/>
               <a:t>Click to edit Master title style</a:t>
             </a:r>
-            <a:endParaRPr lang="en-US"/>
           </a:p>
         </p:txBody>
       </p:sp>
@@ -1910,7 +1898,7 @@
           <a:p>
             <a:fld id="{AE0E4962-4B55-4324-B1D8-080E85B5A118}" type="datetimeFigureOut">
               <a:rPr lang="en-US" smtClean="0"/>
-              <a:t>1/15/2016</a:t>
+              <a:t>8/31/2018</a:t>
             </a:fld>
             <a:endParaRPr lang="en-US"/>
           </a:p>
@@ -2005,7 +1993,7 @@
           <a:p>
             <a:fld id="{AE0E4962-4B55-4324-B1D8-080E85B5A118}" type="datetimeFigureOut">
               <a:rPr lang="en-US" smtClean="0"/>
-              <a:t>1/15/2016</a:t>
+              <a:t>8/31/2018</a:t>
             </a:fld>
             <a:endParaRPr lang="en-US"/>
           </a:p>
@@ -2108,10 +2096,9 @@
           </a:lstStyle>
           <a:p>
             <a:r>
-              <a:rPr lang="en-US" smtClean="0"/>
+              <a:rPr lang="en-US"/>
               <a:t>Click to edit Master title style</a:t>
             </a:r>
-            <a:endParaRPr lang="en-US"/>
           </a:p>
         </p:txBody>
       </p:sp>
@@ -2165,38 +2152,37 @@
           <a:p>
             <a:pPr lvl="0"/>
             <a:r>
-              <a:rPr lang="en-US" smtClean="0"/>
+              <a:rPr lang="en-US"/>
               <a:t>Click to edit Master text styles</a:t>
             </a:r>
           </a:p>
           <a:p>
             <a:pPr lvl="1"/>
             <a:r>
-              <a:rPr lang="en-US" smtClean="0"/>
+              <a:rPr lang="en-US"/>
               <a:t>Second level</a:t>
             </a:r>
           </a:p>
           <a:p>
             <a:pPr lvl="2"/>
             <a:r>
-              <a:rPr lang="en-US" smtClean="0"/>
+              <a:rPr lang="en-US"/>
               <a:t>Third level</a:t>
             </a:r>
           </a:p>
           <a:p>
             <a:pPr lvl="3"/>
             <a:r>
-              <a:rPr lang="en-US" smtClean="0"/>
+              <a:rPr lang="en-US"/>
               <a:t>Fourth level</a:t>
             </a:r>
           </a:p>
           <a:p>
             <a:pPr lvl="4"/>
             <a:r>
-              <a:rPr lang="en-US" smtClean="0"/>
+              <a:rPr lang="en-US"/>
               <a:t>Fifth level</a:t>
             </a:r>
-            <a:endParaRPr lang="en-US"/>
           </a:p>
         </p:txBody>
       </p:sp>
@@ -2259,7 +2245,7 @@
           <a:p>
             <a:pPr lvl="0"/>
             <a:r>
-              <a:rPr lang="en-US" smtClean="0"/>
+              <a:rPr lang="en-US"/>
               <a:t>Click to edit Master text styles</a:t>
             </a:r>
           </a:p>
@@ -2282,7 +2268,7 @@
           <a:p>
             <a:fld id="{AE0E4962-4B55-4324-B1D8-080E85B5A118}" type="datetimeFigureOut">
               <a:rPr lang="en-US" smtClean="0"/>
-              <a:t>1/15/2016</a:t>
+              <a:t>8/31/2018</a:t>
             </a:fld>
             <a:endParaRPr lang="en-US"/>
           </a:p>
@@ -2385,10 +2371,9 @@
           </a:lstStyle>
           <a:p>
             <a:r>
-              <a:rPr lang="en-US" smtClean="0"/>
+              <a:rPr lang="en-US"/>
               <a:t>Click to edit Master title style</a:t>
             </a:r>
-            <a:endParaRPr lang="en-US"/>
           </a:p>
         </p:txBody>
       </p:sp>
@@ -2512,7 +2497,7 @@
           <a:p>
             <a:pPr lvl="0"/>
             <a:r>
-              <a:rPr lang="en-US" smtClean="0"/>
+              <a:rPr lang="en-US"/>
               <a:t>Click to edit Master text styles</a:t>
             </a:r>
           </a:p>
@@ -2535,7 +2520,7 @@
           <a:p>
             <a:fld id="{AE0E4962-4B55-4324-B1D8-080E85B5A118}" type="datetimeFigureOut">
               <a:rPr lang="en-US" smtClean="0"/>
-              <a:t>1/15/2016</a:t>
+              <a:t>8/31/2018</a:t>
             </a:fld>
             <a:endParaRPr lang="en-US"/>
           </a:p>
@@ -2644,10 +2629,9 @@
           <a:lstStyle/>
           <a:p>
             <a:r>
-              <a:rPr lang="en-US" smtClean="0"/>
+              <a:rPr lang="en-US"/>
               <a:t>Click to edit Master title style</a:t>
             </a:r>
-            <a:endParaRPr lang="en-US"/>
           </a:p>
         </p:txBody>
       </p:sp>
@@ -2678,38 +2662,37 @@
           <a:p>
             <a:pPr lvl="0"/>
             <a:r>
-              <a:rPr lang="en-US" smtClean="0"/>
+              <a:rPr lang="en-US"/>
               <a:t>Click to edit Master text styles</a:t>
             </a:r>
           </a:p>
           <a:p>
             <a:pPr lvl="1"/>
             <a:r>
-              <a:rPr lang="en-US" smtClean="0"/>
+              <a:rPr lang="en-US"/>
               <a:t>Second level</a:t>
             </a:r>
           </a:p>
           <a:p>
             <a:pPr lvl="2"/>
             <a:r>
-              <a:rPr lang="en-US" smtClean="0"/>
+              <a:rPr lang="en-US"/>
               <a:t>Third level</a:t>
             </a:r>
           </a:p>
           <a:p>
             <a:pPr lvl="3"/>
             <a:r>
-              <a:rPr lang="en-US" smtClean="0"/>
+              <a:rPr lang="en-US"/>
               <a:t>Fourth level</a:t>
             </a:r>
           </a:p>
           <a:p>
             <a:pPr lvl="4"/>
             <a:r>
-              <a:rPr lang="en-US" smtClean="0"/>
+              <a:rPr lang="en-US"/>
               <a:t>Fifth level</a:t>
             </a:r>
-            <a:endParaRPr lang="en-US"/>
           </a:p>
         </p:txBody>
       </p:sp>
@@ -2748,7 +2731,7 @@
           <a:p>
             <a:fld id="{AE0E4962-4B55-4324-B1D8-080E85B5A118}" type="datetimeFigureOut">
               <a:rPr lang="en-US" smtClean="0"/>
-              <a:t>1/15/2016</a:t>
+              <a:t>8/31/2018</a:t>
             </a:fld>
             <a:endParaRPr lang="en-US"/>
           </a:p>
@@ -3144,25 +3127,16 @@
           <a:lstStyle/>
           <a:p>
             <a:r>
-              <a:rPr lang="en-US" dirty="0" smtClean="0"/>
+              <a:rPr lang="en-US" dirty="0"/>
               <a:t>Welcome to the </a:t>
             </a:r>
             <a:br>
-              <a:rPr lang="en-US" dirty="0" smtClean="0"/>
+              <a:rPr lang="en-US" dirty="0"/>
             </a:br>
             <a:r>
-              <a:rPr lang="en-US" dirty="0" smtClean="0"/>
-              <a:t>Investment </a:t>
-            </a:r>
-            <a:r>
               <a:rPr lang="en-US" dirty="0"/>
-              <a:t>S</a:t>
-            </a:r>
-            <a:r>
-              <a:rPr lang="en-US" dirty="0" smtClean="0"/>
-              <a:t>tudy!</a:t>
-            </a:r>
-            <a:endParaRPr lang="en-US" dirty="0"/>
+              <a:t>Investment Study!</a:t>
+            </a:r>
           </a:p>
         </p:txBody>
       </p:sp>
@@ -3190,10 +3164,9 @@
           <a:p>
             <a:pPr algn="ctr"/>
             <a:r>
-              <a:rPr lang="en-US" dirty="0" smtClean="0"/>
+              <a:rPr lang="en-US" dirty="0"/>
               <a:t>- space bar to continue - </a:t>
             </a:r>
-            <a:endParaRPr lang="en-US" dirty="0"/>
           </a:p>
         </p:txBody>
       </p:sp>
@@ -3276,28 +3249,28 @@
               <a:buNone/>
             </a:pPr>
             <a:r>
-              <a:rPr lang="en-US" sz="2400" dirty="0" smtClean="0">
+              <a:rPr lang="en-US" sz="2400" dirty="0">
                 <a:latin typeface="Arial" pitchFamily="34" charset="0"/>
                 <a:cs typeface="Arial" pitchFamily="34" charset="0"/>
               </a:rPr>
               <a:t>There is always an objective, correct probability that the </a:t>
             </a:r>
             <a:r>
-              <a:rPr lang="en-US" sz="2400" b="1" dirty="0" smtClean="0">
+              <a:rPr lang="en-US" sz="2400" b="1" dirty="0">
                 <a:latin typeface="Arial" pitchFamily="34" charset="0"/>
                 <a:cs typeface="Arial" pitchFamily="34" charset="0"/>
               </a:rPr>
               <a:t>stock</a:t>
             </a:r>
             <a:r>
-              <a:rPr lang="en-US" sz="2400" dirty="0" smtClean="0">
+              <a:rPr lang="en-US" sz="2400" dirty="0">
                 <a:latin typeface="Arial" pitchFamily="34" charset="0"/>
                 <a:cs typeface="Arial" pitchFamily="34" charset="0"/>
               </a:rPr>
               <a:t> is </a:t>
             </a:r>
             <a:r>
-              <a:rPr lang="en-US" sz="2400" dirty="0" smtClean="0">
+              <a:rPr lang="en-US" sz="2400" dirty="0">
                 <a:solidFill>
                   <a:srgbClr val="008000"/>
                 </a:solidFill>
@@ -3307,28 +3280,28 @@
               <a:t>good</a:t>
             </a:r>
             <a:r>
-              <a:rPr lang="en-US" sz="2400" dirty="0" smtClean="0">
+              <a:rPr lang="en-US" sz="2400" dirty="0">
                 <a:latin typeface="Arial" pitchFamily="34" charset="0"/>
                 <a:cs typeface="Arial" pitchFamily="34" charset="0"/>
               </a:rPr>
               <a:t>, which depends on the history of dividends paid by the stock already. For instance, at the beginning of each block of trials, the probability that the </a:t>
             </a:r>
             <a:r>
-              <a:rPr lang="en-US" sz="2400" b="1" dirty="0" smtClean="0">
+              <a:rPr lang="en-US" sz="2400" b="1" dirty="0">
                 <a:latin typeface="Arial" pitchFamily="34" charset="0"/>
                 <a:cs typeface="Arial" pitchFamily="34" charset="0"/>
               </a:rPr>
               <a:t>stock</a:t>
             </a:r>
             <a:r>
-              <a:rPr lang="en-US" sz="2400" dirty="0" smtClean="0">
+              <a:rPr lang="en-US" sz="2400" dirty="0">
                 <a:latin typeface="Arial" pitchFamily="34" charset="0"/>
                 <a:cs typeface="Arial" pitchFamily="34" charset="0"/>
               </a:rPr>
               <a:t> is </a:t>
             </a:r>
             <a:r>
-              <a:rPr lang="en-US" sz="2400" dirty="0" smtClean="0">
+              <a:rPr lang="en-US" sz="2400" dirty="0">
                 <a:solidFill>
                   <a:srgbClr val="008000"/>
                 </a:solidFill>
@@ -3338,7 +3311,7 @@
               <a:t>good</a:t>
             </a:r>
             <a:r>
-              <a:rPr lang="en-US" sz="2400" dirty="0" smtClean="0">
+              <a:rPr lang="en-US" sz="2400" dirty="0">
                 <a:latin typeface="Arial" pitchFamily="34" charset="0"/>
                 <a:cs typeface="Arial" pitchFamily="34" charset="0"/>
               </a:rPr>
@@ -3349,58 +3322,54 @@
             <a:pPr marL="0" indent="0">
               <a:buNone/>
             </a:pPr>
-            <a:endParaRPr lang="en-US" sz="2400" dirty="0" smtClean="0">
-              <a:latin typeface="Arial" pitchFamily="34" charset="0"/>
-              <a:cs typeface="Arial" pitchFamily="34" charset="0"/>
-            </a:endParaRPr>
-          </a:p>
-          <a:p>
-            <a:pPr marL="0" indent="0">
-              <a:buNone/>
-            </a:pPr>
-            <a:r>
-              <a:rPr lang="en-US" sz="2400" dirty="0" smtClean="0">
-                <a:latin typeface="Arial" pitchFamily="34" charset="0"/>
-                <a:cs typeface="Arial" pitchFamily="34" charset="0"/>
-              </a:rPr>
-              <a:t>As you observe the dividends paid by the </a:t>
-            </a:r>
-            <a:r>
-              <a:rPr lang="en-US" sz="2400" b="1" dirty="0" smtClean="0">
-                <a:latin typeface="Arial" pitchFamily="34" charset="0"/>
-                <a:cs typeface="Arial" pitchFamily="34" charset="0"/>
-              </a:rPr>
-              <a:t>stock</a:t>
-            </a:r>
-            <a:r>
-              <a:rPr lang="en-US" sz="2400" dirty="0" smtClean="0">
-                <a:latin typeface="Arial" pitchFamily="34" charset="0"/>
-                <a:cs typeface="Arial" pitchFamily="34" charset="0"/>
-              </a:rPr>
-              <a:t> you will update your belief whether it is </a:t>
-            </a:r>
-            <a:r>
-              <a:rPr lang="en-US" sz="2400" dirty="0" smtClean="0">
-                <a:solidFill>
-                  <a:srgbClr val="008000"/>
-                </a:solidFill>
-                <a:latin typeface="Arial" pitchFamily="34" charset="0"/>
-                <a:cs typeface="Arial" pitchFamily="34" charset="0"/>
-              </a:rPr>
-              <a:t>good</a:t>
-            </a:r>
-            <a:r>
-              <a:rPr lang="en-US" sz="2400" dirty="0" smtClean="0">
-                <a:latin typeface="Arial" pitchFamily="34" charset="0"/>
-                <a:cs typeface="Arial" pitchFamily="34" charset="0"/>
-              </a:rPr>
-              <a:t>. How much you trust your ability to calculate this probability could vary. Sometimes you may not be too confident in the probability estimate you calculated and some times you may be highly confident in this estimate. </a:t>
-            </a:r>
             <a:endParaRPr lang="en-US" sz="2400" dirty="0">
               <a:latin typeface="Arial" pitchFamily="34" charset="0"/>
               <a:cs typeface="Arial" pitchFamily="34" charset="0"/>
             </a:endParaRPr>
           </a:p>
+          <a:p>
+            <a:pPr marL="0" indent="0">
+              <a:buNone/>
+            </a:pPr>
+            <a:r>
+              <a:rPr lang="en-US" sz="2400" dirty="0">
+                <a:latin typeface="Arial" pitchFamily="34" charset="0"/>
+                <a:cs typeface="Arial" pitchFamily="34" charset="0"/>
+              </a:rPr>
+              <a:t>As you observe the dividends paid by the </a:t>
+            </a:r>
+            <a:r>
+              <a:rPr lang="en-US" sz="2400" b="1" dirty="0">
+                <a:latin typeface="Arial" pitchFamily="34" charset="0"/>
+                <a:cs typeface="Arial" pitchFamily="34" charset="0"/>
+              </a:rPr>
+              <a:t>stock</a:t>
+            </a:r>
+            <a:r>
+              <a:rPr lang="en-US" sz="2400" dirty="0">
+                <a:latin typeface="Arial" pitchFamily="34" charset="0"/>
+                <a:cs typeface="Arial" pitchFamily="34" charset="0"/>
+              </a:rPr>
+              <a:t> you will update your belief whether it is </a:t>
+            </a:r>
+            <a:r>
+              <a:rPr lang="en-US" sz="2400" dirty="0">
+                <a:solidFill>
+                  <a:srgbClr val="008000"/>
+                </a:solidFill>
+                <a:latin typeface="Arial" pitchFamily="34" charset="0"/>
+                <a:cs typeface="Arial" pitchFamily="34" charset="0"/>
+              </a:rPr>
+              <a:t>good</a:t>
+            </a:r>
+            <a:r>
+              <a:rPr lang="en-US" sz="2400" dirty="0">
+                <a:latin typeface="Arial" pitchFamily="34" charset="0"/>
+                <a:cs typeface="Arial" pitchFamily="34" charset="0"/>
+              </a:rPr>
+              <a:t>. How much you trust your ability to calculate this probability could vary. Sometimes you may not be too confident in the probability estimate you calculated and some times you may be highly confident in this estimate. </a:t>
+            </a:r>
+          </a:p>
         </p:txBody>
       </p:sp>
       <p:sp>
@@ -3427,10 +3396,9 @@
           <a:p>
             <a:pPr algn="ctr"/>
             <a:r>
-              <a:rPr lang="en-US" dirty="0" smtClean="0"/>
+              <a:rPr lang="en-US" dirty="0"/>
               <a:t>- space bar to continue - </a:t>
             </a:r>
-            <a:endParaRPr lang="en-US" dirty="0"/>
           </a:p>
         </p:txBody>
       </p:sp>
@@ -3490,7 +3458,7 @@
               <a:buNone/>
             </a:pPr>
             <a:r>
-              <a:rPr lang="en-US" sz="2400" dirty="0" smtClean="0">
+              <a:rPr lang="en-US" sz="2400" dirty="0">
                 <a:latin typeface="Arial" pitchFamily="34" charset="0"/>
                 <a:cs typeface="Arial" pitchFamily="34" charset="0"/>
               </a:rPr>
@@ -3502,14 +3470,14 @@
               <a:buNone/>
             </a:pPr>
             <a:r>
-              <a:rPr lang="en-US" sz="2400" u="sng" dirty="0" smtClean="0">
+              <a:rPr lang="en-US" sz="2400" u="sng" dirty="0">
                 <a:latin typeface="Arial" pitchFamily="34" charset="0"/>
                 <a:cs typeface="Arial" pitchFamily="34" charset="0"/>
               </a:rPr>
               <a:t>From </a:t>
             </a:r>
             <a:r>
-              <a:rPr lang="en-US" sz="2400" u="sng" dirty="0" smtClean="0">
+              <a:rPr lang="en-US" sz="2400" u="sng" dirty="0">
                 <a:solidFill>
                   <a:srgbClr val="008000"/>
                 </a:solidFill>
@@ -3519,32 +3487,32 @@
               <a:t>good</a:t>
             </a:r>
             <a:r>
-              <a:rPr lang="en-US" sz="2400" u="sng" dirty="0" smtClean="0">
+              <a:rPr lang="en-US" sz="2400" u="sng" dirty="0">
                 <a:latin typeface="Arial" pitchFamily="34" charset="0"/>
                 <a:cs typeface="Arial" pitchFamily="34" charset="0"/>
               </a:rPr>
               <a:t> </a:t>
             </a:r>
             <a:r>
-              <a:rPr lang="en-US" sz="2400" b="1" u="sng" dirty="0" smtClean="0">
+              <a:rPr lang="en-US" sz="2400" b="1" u="sng" dirty="0">
                 <a:latin typeface="Arial" pitchFamily="34" charset="0"/>
                 <a:cs typeface="Arial" pitchFamily="34" charset="0"/>
               </a:rPr>
               <a:t>stock</a:t>
             </a:r>
             <a:r>
-              <a:rPr lang="en-US" sz="2400" u="sng" dirty="0" smtClean="0">
+              <a:rPr lang="en-US" sz="2400" u="sng" dirty="0">
                 <a:latin typeface="Arial" pitchFamily="34" charset="0"/>
                 <a:cs typeface="Arial" pitchFamily="34" charset="0"/>
               </a:rPr>
               <a:t> probability estimates</a:t>
             </a:r>
             <a:r>
-              <a:rPr lang="en-US" sz="2400" dirty="0" smtClean="0">
-                <a:latin typeface="Arial" pitchFamily="34" charset="0"/>
-                <a:cs typeface="Arial" pitchFamily="34" charset="0"/>
-              </a:rPr>
-              <a:t>: We will pay you 10 cents for every probability estimate that is within 5% of the true probability. Earnings from accurate probability estimates will be added to your $15 base payment. </a:t>
+              <a:rPr lang="en-US" sz="2400" dirty="0">
+                <a:latin typeface="Arial" pitchFamily="34" charset="0"/>
+                <a:cs typeface="Arial" pitchFamily="34" charset="0"/>
+              </a:rPr>
+              <a:t>: We will pay you 10 cents for every probability estimate that is within 5% of the true probability. Earnings from accurate probability estimates will be added to your $25 base payment. </a:t>
             </a:r>
           </a:p>
           <a:p>
@@ -3561,14 +3529,14 @@
               <a:buNone/>
             </a:pPr>
             <a:r>
-              <a:rPr lang="en-US" sz="2400" u="sng" dirty="0" smtClean="0">
+              <a:rPr lang="en-US" sz="2400" u="sng" dirty="0">
                 <a:latin typeface="Arial" pitchFamily="34" charset="0"/>
                 <a:cs typeface="Arial" pitchFamily="34" charset="0"/>
               </a:rPr>
               <a:t>From investment choices</a:t>
             </a:r>
             <a:r>
-              <a:rPr lang="en-US" sz="2400" dirty="0" smtClean="0">
+              <a:rPr lang="en-US" sz="2400" dirty="0">
                 <a:latin typeface="Arial" pitchFamily="34" charset="0"/>
                 <a:cs typeface="Arial" pitchFamily="34" charset="0"/>
               </a:rPr>
@@ -3589,25 +3557,25 @@
               <a:buNone/>
             </a:pPr>
             <a:r>
-              <a:rPr lang="en-US" sz="1900" dirty="0" smtClean="0">
+              <a:rPr lang="en-US" sz="1900" dirty="0">
                 <a:latin typeface="Arial" pitchFamily="34" charset="0"/>
                 <a:cs typeface="Arial" pitchFamily="34" charset="0"/>
               </a:rPr>
               <a:t>*Note, if you have a negative investment total, will </a:t>
             </a:r>
             <a:r>
-              <a:rPr lang="en-US" sz="1900" u="sng" dirty="0" smtClean="0">
+              <a:rPr lang="en-US" sz="1900" u="sng" dirty="0">
                 <a:latin typeface="Arial" pitchFamily="34" charset="0"/>
                 <a:cs typeface="Arial" pitchFamily="34" charset="0"/>
               </a:rPr>
               <a:t>we will subtract</a:t>
             </a:r>
             <a:r>
-              <a:rPr lang="en-US" sz="1900" dirty="0" smtClean="0">
-                <a:latin typeface="Arial" pitchFamily="34" charset="0"/>
-                <a:cs typeface="Arial" pitchFamily="34" charset="0"/>
-              </a:rPr>
-              <a:t> 10% of this amount from your base payment, but the minimum subject payment is $10. </a:t>
+              <a:rPr lang="en-US" sz="1900" dirty="0">
+                <a:latin typeface="Arial" pitchFamily="34" charset="0"/>
+                <a:cs typeface="Arial" pitchFamily="34" charset="0"/>
+              </a:rPr>
+              <a:t> 10% of this amount from your base payment, but the minimum subject payment is $20. </a:t>
             </a:r>
           </a:p>
           <a:p>
@@ -3623,7 +3591,7 @@
             <a:pPr marL="0" indent="0">
               <a:buNone/>
             </a:pPr>
-            <a:endParaRPr lang="en-US" sz="2400" dirty="0" smtClean="0">
+            <a:endParaRPr lang="en-US" sz="2400" dirty="0">
               <a:latin typeface="Arial" pitchFamily="34" charset="0"/>
               <a:cs typeface="Arial" pitchFamily="34" charset="0"/>
             </a:endParaRPr>
@@ -3654,10 +3622,9 @@
           <a:p>
             <a:pPr algn="ctr"/>
             <a:r>
-              <a:rPr lang="en-US" dirty="0" smtClean="0"/>
+              <a:rPr lang="en-US" dirty="0"/>
               <a:t>- Tell the experimenter when you’re ready to begin - </a:t>
             </a:r>
-            <a:endParaRPr lang="en-US" dirty="0"/>
           </a:p>
         </p:txBody>
       </p:sp>
@@ -3711,7 +3678,7 @@
             <a:pPr marL="0" indent="0" algn="ctr">
               <a:buNone/>
             </a:pPr>
-            <a:endParaRPr lang="en-US" sz="4800" dirty="0" smtClean="0">
+            <a:endParaRPr lang="en-US" sz="4800" dirty="0">
               <a:latin typeface="Arial" pitchFamily="34" charset="0"/>
               <a:cs typeface="Arial" pitchFamily="34" charset="0"/>
             </a:endParaRPr>
@@ -3721,35 +3688,21 @@
               <a:buNone/>
             </a:pPr>
             <a:r>
-              <a:rPr lang="en-US" sz="4800" dirty="0" smtClean="0">
+              <a:rPr lang="en-US" sz="4800" dirty="0">
                 <a:latin typeface="Arial" pitchFamily="34" charset="0"/>
                 <a:cs typeface="Arial" pitchFamily="34" charset="0"/>
               </a:rPr>
               <a:t>This </a:t>
             </a:r>
             <a:r>
-              <a:rPr lang="en-US" sz="4800" smtClean="0">
-                <a:latin typeface="Arial" pitchFamily="34" charset="0"/>
-                <a:cs typeface="Arial" pitchFamily="34" charset="0"/>
-              </a:rPr>
-              <a:t>is </a:t>
-            </a:r>
-            <a:r>
-              <a:rPr lang="en-US" sz="4800" smtClean="0">
-                <a:latin typeface="Arial" pitchFamily="34" charset="0"/>
-                <a:cs typeface="Arial" pitchFamily="34" charset="0"/>
-              </a:rPr>
-              <a:t>a </a:t>
-            </a:r>
-            <a:r>
-              <a:rPr lang="en-US" sz="4800" smtClean="0">
-                <a:latin typeface="Arial" pitchFamily="34" charset="0"/>
-                <a:cs typeface="Arial" pitchFamily="34" charset="0"/>
-              </a:rPr>
-              <a:t>LOSS </a:t>
-            </a:r>
-            <a:r>
-              <a:rPr lang="en-US" sz="4800" dirty="0" smtClean="0">
+              <a:rPr lang="en-US" sz="4800">
+                <a:latin typeface="Arial" pitchFamily="34" charset="0"/>
+                <a:cs typeface="Arial" pitchFamily="34" charset="0"/>
+              </a:rPr>
+              <a:t>is a LOSS </a:t>
+            </a:r>
+            <a:r>
+              <a:rPr lang="en-US" sz="4800" dirty="0">
                 <a:latin typeface="Arial" pitchFamily="34" charset="0"/>
                 <a:cs typeface="Arial" pitchFamily="34" charset="0"/>
               </a:rPr>
@@ -3761,7 +3714,7 @@
               <a:buNone/>
             </a:pPr>
             <a:r>
-              <a:rPr lang="en-US" dirty="0" smtClean="0">
+              <a:rPr lang="en-US" dirty="0">
                 <a:latin typeface="Arial" pitchFamily="34" charset="0"/>
                 <a:cs typeface="Arial" pitchFamily="34" charset="0"/>
               </a:rPr>
@@ -3803,10 +3756,9 @@
           <a:p>
             <a:pPr algn="ctr"/>
             <a:r>
-              <a:rPr lang="en-US" dirty="0" smtClean="0"/>
+              <a:rPr lang="en-US" dirty="0"/>
               <a:t>- space bar to continue - </a:t>
             </a:r>
-            <a:endParaRPr lang="en-US" dirty="0"/>
           </a:p>
         </p:txBody>
       </p:sp>
@@ -3870,7 +3822,7 @@
               <a:buNone/>
             </a:pPr>
             <a:r>
-              <a:rPr lang="en-US" sz="4800" dirty="0" smtClean="0">
+              <a:rPr lang="en-US" sz="4800" dirty="0">
                 <a:latin typeface="Arial" pitchFamily="34" charset="0"/>
                 <a:cs typeface="Arial" pitchFamily="34" charset="0"/>
               </a:rPr>
@@ -3882,16 +3834,12 @@
               <a:buNone/>
             </a:pPr>
             <a:r>
-              <a:rPr lang="en-US" dirty="0" smtClean="0">
+              <a:rPr lang="en-US" dirty="0">
                 <a:latin typeface="Arial" pitchFamily="34" charset="0"/>
                 <a:cs typeface="Arial" pitchFamily="34" charset="0"/>
               </a:rPr>
               <a:t>The two securities will only provide POSITIVE payoffs</a:t>
             </a:r>
-            <a:endParaRPr lang="en-US" dirty="0">
-              <a:latin typeface="Arial" pitchFamily="34" charset="0"/>
-              <a:cs typeface="Arial" pitchFamily="34" charset="0"/>
-            </a:endParaRPr>
           </a:p>
         </p:txBody>
       </p:sp>
@@ -3919,10 +3867,9 @@
           <a:p>
             <a:pPr algn="ctr"/>
             <a:r>
-              <a:rPr lang="en-US" dirty="0" smtClean="0"/>
+              <a:rPr lang="en-US" dirty="0"/>
               <a:t>- space bar to continue - </a:t>
             </a:r>
-            <a:endParaRPr lang="en-US" dirty="0"/>
           </a:p>
         </p:txBody>
       </p:sp>
@@ -3977,35 +3924,35 @@
               <a:buNone/>
             </a:pPr>
             <a:r>
-              <a:rPr lang="en-US" sz="2400" dirty="0" smtClean="0">
+              <a:rPr lang="en-US" sz="2400" dirty="0">
                 <a:latin typeface="Arial" pitchFamily="34" charset="0"/>
                 <a:cs typeface="Arial" pitchFamily="34" charset="0"/>
               </a:rPr>
               <a:t>In this study you will work on an investment task. During the task, you will repeatedly invest in one of two securities: A risky security (i.e., a </a:t>
             </a:r>
             <a:r>
-              <a:rPr lang="en-US" sz="2400" b="1" dirty="0" smtClean="0">
+              <a:rPr lang="en-US" sz="2400" b="1" dirty="0">
                 <a:latin typeface="Arial" pitchFamily="34" charset="0"/>
                 <a:cs typeface="Arial" pitchFamily="34" charset="0"/>
               </a:rPr>
               <a:t>stock</a:t>
             </a:r>
             <a:r>
-              <a:rPr lang="en-US" sz="2400" dirty="0" smtClean="0">
+              <a:rPr lang="en-US" sz="2400" dirty="0">
                 <a:latin typeface="Arial" pitchFamily="34" charset="0"/>
                 <a:cs typeface="Arial" pitchFamily="34" charset="0"/>
               </a:rPr>
               <a:t> with risky payoffs) and a riskless security (i.e., a </a:t>
             </a:r>
             <a:r>
-              <a:rPr lang="en-US" sz="2400" b="1" dirty="0" smtClean="0">
+              <a:rPr lang="en-US" sz="2400" b="1" dirty="0">
                 <a:latin typeface="Arial" pitchFamily="34" charset="0"/>
                 <a:cs typeface="Arial" pitchFamily="34" charset="0"/>
               </a:rPr>
               <a:t>bond</a:t>
             </a:r>
             <a:r>
-              <a:rPr lang="en-US" sz="2400" dirty="0" smtClean="0">
+              <a:rPr lang="en-US" sz="2400" dirty="0">
                 <a:latin typeface="Arial" pitchFamily="34" charset="0"/>
                 <a:cs typeface="Arial" pitchFamily="34" charset="0"/>
               </a:rPr>
@@ -4030,17 +3977,10 @@
                 <a:latin typeface="Arial" pitchFamily="34" charset="0"/>
                 <a:cs typeface="Arial" pitchFamily="34" charset="0"/>
               </a:rPr>
-              <a:t>Y</a:t>
-            </a:r>
-            <a:r>
-              <a:rPr lang="en-US" sz="2400" dirty="0" smtClean="0">
-                <a:latin typeface="Arial" pitchFamily="34" charset="0"/>
-                <a:cs typeface="Arial" pitchFamily="34" charset="0"/>
-              </a:rPr>
-              <a:t>ou will also be asked to provide estimates as to how </a:t>
-            </a:r>
-            <a:r>
-              <a:rPr lang="en-US" sz="2400" dirty="0" smtClean="0">
+              <a:t>You will also be asked to provide estimates as to how </a:t>
+            </a:r>
+            <a:r>
+              <a:rPr lang="en-US" sz="2400" dirty="0">
                 <a:solidFill>
                   <a:srgbClr val="008000"/>
                 </a:solidFill>
@@ -4050,30 +3990,26 @@
               <a:t>good</a:t>
             </a:r>
             <a:r>
-              <a:rPr lang="en-US" sz="2400" dirty="0" smtClean="0">
+              <a:rPr lang="en-US" sz="2400" dirty="0">
                 <a:latin typeface="Arial" pitchFamily="34" charset="0"/>
                 <a:cs typeface="Arial" pitchFamily="34" charset="0"/>
               </a:rPr>
               <a:t> an investment in the </a:t>
             </a:r>
             <a:r>
-              <a:rPr lang="en-US" sz="2400" b="1" dirty="0" smtClean="0">
+              <a:rPr lang="en-US" sz="2400" b="1" dirty="0">
                 <a:latin typeface="Arial" pitchFamily="34" charset="0"/>
                 <a:cs typeface="Arial" pitchFamily="34" charset="0"/>
               </a:rPr>
               <a:t>stock</a:t>
             </a:r>
             <a:r>
-              <a:rPr lang="en-US" sz="2400" dirty="0" smtClean="0">
+              <a:rPr lang="en-US" sz="2400" dirty="0">
                 <a:latin typeface="Arial" pitchFamily="34" charset="0"/>
                 <a:cs typeface="Arial" pitchFamily="34" charset="0"/>
               </a:rPr>
               <a:t> is, after observing its payoffs. </a:t>
             </a:r>
-            <a:endParaRPr lang="en-US" sz="2400" dirty="0">
-              <a:latin typeface="Arial" pitchFamily="34" charset="0"/>
-              <a:cs typeface="Arial" pitchFamily="34" charset="0"/>
-            </a:endParaRPr>
           </a:p>
         </p:txBody>
       </p:sp>
@@ -4101,10 +4037,9 @@
           <a:p>
             <a:pPr algn="ctr"/>
             <a:r>
-              <a:rPr lang="en-US" dirty="0" smtClean="0"/>
+              <a:rPr lang="en-US" dirty="0"/>
               <a:t>- space bar to continue - </a:t>
             </a:r>
-            <a:endParaRPr lang="en-US" dirty="0"/>
           </a:p>
         </p:txBody>
       </p:sp>
@@ -4164,7 +4099,7 @@
               <a:buNone/>
             </a:pPr>
             <a:r>
-              <a:rPr lang="en-US" sz="2400" dirty="0" smtClean="0">
+              <a:rPr lang="en-US" sz="2400" dirty="0">
                 <a:latin typeface="Arial" pitchFamily="34" charset="0"/>
                 <a:cs typeface="Arial" pitchFamily="34" charset="0"/>
               </a:rPr>
@@ -4185,16 +4120,12 @@
               <a:buNone/>
             </a:pPr>
             <a:r>
-              <a:rPr lang="en-US" sz="2400" dirty="0" smtClean="0">
+              <a:rPr lang="en-US" sz="2400" dirty="0">
                 <a:latin typeface="Arial" pitchFamily="34" charset="0"/>
                 <a:cs typeface="Arial" pitchFamily="34" charset="0"/>
               </a:rPr>
               <a:t>In the GAIN condition, the two securities will only provide POSITIVE payoffs. In the LOSS condition, the two securities will only provide NEGATIVE payoffs. </a:t>
             </a:r>
-            <a:endParaRPr lang="en-US" sz="2400" dirty="0">
-              <a:latin typeface="Arial" pitchFamily="34" charset="0"/>
-              <a:cs typeface="Arial" pitchFamily="34" charset="0"/>
-            </a:endParaRPr>
           </a:p>
         </p:txBody>
       </p:sp>
@@ -4222,10 +4153,9 @@
           <a:p>
             <a:pPr algn="ctr"/>
             <a:r>
-              <a:rPr lang="en-US" dirty="0" smtClean="0"/>
+              <a:rPr lang="en-US" dirty="0"/>
               <a:t>- space bar to continue - </a:t>
             </a:r>
-            <a:endParaRPr lang="en-US" dirty="0"/>
           </a:p>
         </p:txBody>
       </p:sp>
@@ -4285,35 +4215,35 @@
               <a:buNone/>
             </a:pPr>
             <a:r>
-              <a:rPr lang="en-US" sz="2000" dirty="0" smtClean="0">
+              <a:rPr lang="en-US" sz="2000" dirty="0">
                 <a:latin typeface="Arial" pitchFamily="34" charset="0"/>
                 <a:cs typeface="Arial" pitchFamily="34" charset="0"/>
               </a:rPr>
               <a:t>In the GAIN condition, on any trial, if you choose to invest in the </a:t>
             </a:r>
             <a:r>
-              <a:rPr lang="en-US" sz="2000" b="1" dirty="0" smtClean="0">
+              <a:rPr lang="en-US" sz="2000" b="1" dirty="0">
                 <a:latin typeface="Arial" pitchFamily="34" charset="0"/>
                 <a:cs typeface="Arial" pitchFamily="34" charset="0"/>
               </a:rPr>
               <a:t>bond</a:t>
             </a:r>
             <a:r>
-              <a:rPr lang="en-US" sz="2000" dirty="0" smtClean="0">
+              <a:rPr lang="en-US" sz="2000" dirty="0">
                 <a:latin typeface="Arial" pitchFamily="34" charset="0"/>
                 <a:cs typeface="Arial" pitchFamily="34" charset="0"/>
               </a:rPr>
               <a:t>, you get a payoff of $6 for sure at the end of the trial. If you choose to invest in the </a:t>
             </a:r>
             <a:r>
-              <a:rPr lang="en-US" sz="2000" b="1" dirty="0" smtClean="0">
+              <a:rPr lang="en-US" sz="2000" b="1" dirty="0">
                 <a:latin typeface="Arial" pitchFamily="34" charset="0"/>
                 <a:cs typeface="Arial" pitchFamily="34" charset="0"/>
               </a:rPr>
               <a:t>stock</a:t>
             </a:r>
             <a:r>
-              <a:rPr lang="en-US" sz="2000" dirty="0" smtClean="0">
+              <a:rPr lang="en-US" sz="2000" dirty="0">
                 <a:latin typeface="Arial" pitchFamily="34" charset="0"/>
                 <a:cs typeface="Arial" pitchFamily="34" charset="0"/>
               </a:rPr>
@@ -4324,7 +4254,7 @@
             <a:pPr marL="0" indent="0">
               <a:buNone/>
             </a:pPr>
-            <a:endParaRPr lang="en-US" sz="2000" dirty="0" smtClean="0">
+            <a:endParaRPr lang="en-US" sz="2000" dirty="0">
               <a:latin typeface="Arial" pitchFamily="34" charset="0"/>
               <a:cs typeface="Arial" pitchFamily="34" charset="0"/>
             </a:endParaRPr>
@@ -4334,14 +4264,14 @@
               <a:buNone/>
             </a:pPr>
             <a:r>
-              <a:rPr lang="en-US" sz="2000" dirty="0" smtClean="0">
+              <a:rPr lang="en-US" sz="2000" dirty="0">
                 <a:latin typeface="Arial" pitchFamily="34" charset="0"/>
                 <a:cs typeface="Arial" pitchFamily="34" charset="0"/>
               </a:rPr>
               <a:t>The stock can either be </a:t>
             </a:r>
             <a:r>
-              <a:rPr lang="en-US" sz="2000" dirty="0" smtClean="0">
+              <a:rPr lang="en-US" sz="2000" dirty="0">
                 <a:solidFill>
                   <a:srgbClr val="008000"/>
                 </a:solidFill>
@@ -4351,14 +4281,14 @@
               <a:t>good</a:t>
             </a:r>
             <a:r>
-              <a:rPr lang="en-US" sz="2000" dirty="0" smtClean="0">
+              <a:rPr lang="en-US" sz="2000" dirty="0">
                 <a:latin typeface="Arial" pitchFamily="34" charset="0"/>
                 <a:cs typeface="Arial" pitchFamily="34" charset="0"/>
               </a:rPr>
               <a:t> or </a:t>
             </a:r>
             <a:r>
-              <a:rPr lang="en-US" sz="2000" dirty="0" smtClean="0">
+              <a:rPr lang="en-US" sz="2000" dirty="0">
                 <a:solidFill>
                   <a:srgbClr val="FF0000"/>
                 </a:solidFill>
@@ -4368,28 +4298,28 @@
               <a:t>bad</a:t>
             </a:r>
             <a:r>
-              <a:rPr lang="en-US" sz="2000" dirty="0" smtClean="0">
+              <a:rPr lang="en-US" sz="2000" dirty="0">
                 <a:latin typeface="Arial" pitchFamily="34" charset="0"/>
                 <a:cs typeface="Arial" pitchFamily="34" charset="0"/>
               </a:rPr>
               <a:t>, and this will determine the likelihood of its dividend being high or low. In the GAIN condition, if the </a:t>
             </a:r>
             <a:r>
-              <a:rPr lang="en-US" sz="2000" b="1" dirty="0" smtClean="0">
+              <a:rPr lang="en-US" sz="2000" b="1" dirty="0">
                 <a:latin typeface="Arial" pitchFamily="34" charset="0"/>
                 <a:cs typeface="Arial" pitchFamily="34" charset="0"/>
               </a:rPr>
               <a:t>stock</a:t>
             </a:r>
             <a:r>
-              <a:rPr lang="en-US" sz="2000" dirty="0" smtClean="0">
+              <a:rPr lang="en-US" sz="2000" dirty="0">
                 <a:latin typeface="Arial" pitchFamily="34" charset="0"/>
                 <a:cs typeface="Arial" pitchFamily="34" charset="0"/>
               </a:rPr>
               <a:t> is </a:t>
             </a:r>
             <a:r>
-              <a:rPr lang="en-US" sz="2000" dirty="0" smtClean="0">
+              <a:rPr lang="en-US" sz="2000" dirty="0">
                 <a:solidFill>
                   <a:srgbClr val="008000"/>
                 </a:solidFill>
@@ -4399,7 +4329,7 @@
               <a:t>good</a:t>
             </a:r>
             <a:r>
-              <a:rPr lang="en-US" sz="2000" dirty="0" smtClean="0">
+              <a:rPr lang="en-US" sz="2000" dirty="0">
                 <a:latin typeface="Arial" pitchFamily="34" charset="0"/>
                 <a:cs typeface="Arial" pitchFamily="34" charset="0"/>
               </a:rPr>
@@ -4410,7 +4340,7 @@
             <a:pPr marL="0" indent="0">
               <a:buNone/>
             </a:pPr>
-            <a:endParaRPr lang="en-US" sz="2000" dirty="0" smtClean="0">
+            <a:endParaRPr lang="en-US" sz="2000" dirty="0">
               <a:latin typeface="Arial" pitchFamily="34" charset="0"/>
               <a:cs typeface="Arial" pitchFamily="34" charset="0"/>
             </a:endParaRPr>
@@ -4420,42 +4350,42 @@
               <a:buNone/>
             </a:pPr>
             <a:r>
-              <a:rPr lang="en-US" sz="2000" dirty="0" smtClean="0">
+              <a:rPr lang="en-US" sz="2000" dirty="0">
                 <a:latin typeface="Arial" pitchFamily="34" charset="0"/>
                 <a:cs typeface="Arial" pitchFamily="34" charset="0"/>
               </a:rPr>
               <a:t>The dividends paid by this </a:t>
             </a:r>
             <a:r>
-              <a:rPr lang="en-US" sz="2000" b="1" dirty="0" smtClean="0">
+              <a:rPr lang="en-US" sz="2000" b="1" dirty="0">
                 <a:latin typeface="Arial" pitchFamily="34" charset="0"/>
                 <a:cs typeface="Arial" pitchFamily="34" charset="0"/>
               </a:rPr>
               <a:t>stock </a:t>
             </a:r>
             <a:r>
-              <a:rPr lang="en-US" sz="2000" dirty="0" smtClean="0">
+              <a:rPr lang="en-US" sz="2000" dirty="0">
                 <a:latin typeface="Arial" pitchFamily="34" charset="0"/>
                 <a:cs typeface="Arial" pitchFamily="34" charset="0"/>
               </a:rPr>
               <a:t>are independent from trial to trial, but come from this exact distribution. In other words, once it is determined by the computer that the </a:t>
             </a:r>
             <a:r>
-              <a:rPr lang="en-US" sz="2000" b="1" dirty="0" smtClean="0">
+              <a:rPr lang="en-US" sz="2000" b="1" dirty="0">
                 <a:latin typeface="Arial" pitchFamily="34" charset="0"/>
                 <a:cs typeface="Arial" pitchFamily="34" charset="0"/>
               </a:rPr>
               <a:t>stock</a:t>
             </a:r>
             <a:r>
-              <a:rPr lang="en-US" sz="2000" dirty="0" smtClean="0">
+              <a:rPr lang="en-US" sz="2000" dirty="0">
                 <a:latin typeface="Arial" pitchFamily="34" charset="0"/>
                 <a:cs typeface="Arial" pitchFamily="34" charset="0"/>
               </a:rPr>
               <a:t> is </a:t>
             </a:r>
             <a:r>
-              <a:rPr lang="en-US" sz="2000" dirty="0" smtClean="0">
+              <a:rPr lang="en-US" sz="2000" dirty="0">
                 <a:solidFill>
                   <a:srgbClr val="008000"/>
                 </a:solidFill>
@@ -4465,7 +4395,7 @@
               <a:t>good</a:t>
             </a:r>
             <a:r>
-              <a:rPr lang="en-US" sz="2000" dirty="0" smtClean="0">
+              <a:rPr lang="en-US" sz="2000" dirty="0">
                 <a:latin typeface="Arial" pitchFamily="34" charset="0"/>
                 <a:cs typeface="Arial" pitchFamily="34" charset="0"/>
               </a:rPr>
@@ -4498,10 +4428,9 @@
           <a:p>
             <a:pPr algn="ctr"/>
             <a:r>
-              <a:rPr lang="en-US" dirty="0" smtClean="0"/>
+              <a:rPr lang="en-US" dirty="0"/>
               <a:t>- space bar to continue - </a:t>
             </a:r>
-            <a:endParaRPr lang="en-US" dirty="0"/>
           </a:p>
         </p:txBody>
       </p:sp>
@@ -4628,13 +4557,8 @@
             <a:pPr algn="ctr"/>
             <a:r>
               <a:rPr lang="en-US" sz="1200" dirty="0"/>
-              <a:t>S</a:t>
-            </a:r>
-            <a:r>
-              <a:rPr lang="en-US" sz="1200" dirty="0" smtClean="0"/>
-              <a:t>tock</a:t>
-            </a:r>
-            <a:endParaRPr lang="en-US" sz="1200" dirty="0"/>
+              <a:t>Stock</a:t>
+            </a:r>
           </a:p>
         </p:txBody>
       </p:sp>
@@ -4663,13 +4587,8 @@
             <a:pPr algn="ctr"/>
             <a:r>
               <a:rPr lang="en-US" sz="1200" dirty="0"/>
-              <a:t>B</a:t>
-            </a:r>
-            <a:r>
-              <a:rPr lang="en-US" sz="1200" dirty="0" smtClean="0"/>
-              <a:t>ond</a:t>
-            </a:r>
-            <a:endParaRPr lang="en-US" sz="1200" dirty="0"/>
+              <a:t>Bond</a:t>
+            </a:r>
           </a:p>
         </p:txBody>
       </p:sp>
@@ -4697,17 +4616,16 @@
           <a:p>
             <a:pPr algn="ctr"/>
             <a:r>
-              <a:rPr lang="en-US" sz="1100" dirty="0" smtClean="0"/>
+              <a:rPr lang="en-US" sz="1100" dirty="0"/>
               <a:t>Payoff </a:t>
             </a:r>
           </a:p>
           <a:p>
             <a:pPr algn="ctr"/>
             <a:r>
-              <a:rPr lang="en-US" sz="1100" dirty="0" smtClean="0"/>
+              <a:rPr lang="en-US" sz="1100" dirty="0"/>
               <a:t>$10 or $2</a:t>
             </a:r>
-            <a:endParaRPr lang="en-US" sz="1100" dirty="0"/>
           </a:p>
         </p:txBody>
       </p:sp>
@@ -4735,17 +4653,16 @@
           <a:p>
             <a:pPr algn="ctr"/>
             <a:r>
-              <a:rPr lang="en-US" sz="1100" dirty="0" smtClean="0"/>
+              <a:rPr lang="en-US" sz="1100" dirty="0"/>
               <a:t>Payoff </a:t>
             </a:r>
           </a:p>
           <a:p>
             <a:pPr algn="ctr"/>
             <a:r>
-              <a:rPr lang="en-US" sz="1100" dirty="0" smtClean="0"/>
+              <a:rPr lang="en-US" sz="1100" dirty="0"/>
               <a:t>$6</a:t>
             </a:r>
-            <a:endParaRPr lang="en-US" sz="1100" dirty="0"/>
           </a:p>
         </p:txBody>
       </p:sp>
@@ -4772,10 +4689,9 @@
           <a:lstStyle/>
           <a:p>
             <a:r>
-              <a:rPr lang="en-US" dirty="0" smtClean="0"/>
+              <a:rPr lang="en-US" dirty="0"/>
               <a:t>Example </a:t>
             </a:r>
-            <a:endParaRPr lang="en-US" dirty="0"/>
           </a:p>
         </p:txBody>
       </p:sp>
@@ -4880,14 +4796,14 @@
               <a:buNone/>
             </a:pPr>
             <a:r>
-              <a:rPr lang="en-US" sz="2400" dirty="0" smtClean="0">
+              <a:rPr lang="en-US" sz="2400" dirty="0">
                 <a:latin typeface="Arial" pitchFamily="34" charset="0"/>
                 <a:cs typeface="Arial" pitchFamily="34" charset="0"/>
               </a:rPr>
               <a:t>In the GAIN condition, if the stock is </a:t>
             </a:r>
             <a:r>
-              <a:rPr lang="en-US" sz="2400" dirty="0" smtClean="0">
+              <a:rPr lang="en-US" sz="2400" dirty="0">
                 <a:solidFill>
                   <a:srgbClr val="FF0000"/>
                 </a:solidFill>
@@ -4897,7 +4813,7 @@
               <a:t>bad</a:t>
             </a:r>
             <a:r>
-              <a:rPr lang="en-US" sz="2400" dirty="0" smtClean="0">
+              <a:rPr lang="en-US" sz="2400" dirty="0">
                 <a:latin typeface="Arial" pitchFamily="34" charset="0"/>
                 <a:cs typeface="Arial" pitchFamily="34" charset="0"/>
               </a:rPr>
@@ -4918,28 +4834,28 @@
               <a:buNone/>
             </a:pPr>
             <a:r>
-              <a:rPr lang="en-US" sz="2400" dirty="0" smtClean="0">
+              <a:rPr lang="en-US" sz="2400" dirty="0">
                 <a:latin typeface="Arial" pitchFamily="34" charset="0"/>
                 <a:cs typeface="Arial" pitchFamily="34" charset="0"/>
               </a:rPr>
               <a:t>Once the computer determines that the </a:t>
             </a:r>
             <a:r>
-              <a:rPr lang="en-US" sz="2400" b="1" dirty="0" smtClean="0">
+              <a:rPr lang="en-US" sz="2400" b="1" dirty="0">
                 <a:latin typeface="Arial" pitchFamily="34" charset="0"/>
                 <a:cs typeface="Arial" pitchFamily="34" charset="0"/>
               </a:rPr>
               <a:t>stock</a:t>
             </a:r>
             <a:r>
-              <a:rPr lang="en-US" sz="2400" dirty="0" smtClean="0">
+              <a:rPr lang="en-US" sz="2400" dirty="0">
                 <a:latin typeface="Arial" pitchFamily="34" charset="0"/>
                 <a:cs typeface="Arial" pitchFamily="34" charset="0"/>
               </a:rPr>
               <a:t> is either </a:t>
             </a:r>
             <a:r>
-              <a:rPr lang="en-US" sz="2400" dirty="0" smtClean="0">
+              <a:rPr lang="en-US" sz="2400" dirty="0">
                 <a:solidFill>
                   <a:srgbClr val="008000"/>
                 </a:solidFill>
@@ -4949,14 +4865,14 @@
               <a:t>good</a:t>
             </a:r>
             <a:r>
-              <a:rPr lang="en-US" sz="2400" dirty="0" smtClean="0">
+              <a:rPr lang="en-US" sz="2400" dirty="0">
                 <a:latin typeface="Arial" pitchFamily="34" charset="0"/>
                 <a:cs typeface="Arial" pitchFamily="34" charset="0"/>
               </a:rPr>
               <a:t> or </a:t>
             </a:r>
             <a:r>
-              <a:rPr lang="en-US" sz="2400" dirty="0" smtClean="0">
+              <a:rPr lang="en-US" sz="2400" dirty="0">
                 <a:solidFill>
                   <a:srgbClr val="FF0000"/>
                 </a:solidFill>
@@ -4966,7 +4882,7 @@
               <a:t>bad</a:t>
             </a:r>
             <a:r>
-              <a:rPr lang="en-US" sz="2400" dirty="0" smtClean="0">
+              <a:rPr lang="en-US" sz="2400" dirty="0">
                 <a:latin typeface="Arial" pitchFamily="34" charset="0"/>
                 <a:cs typeface="Arial" pitchFamily="34" charset="0"/>
               </a:rPr>
@@ -4977,7 +4893,7 @@
             <a:pPr marL="0" indent="0">
               <a:buNone/>
             </a:pPr>
-            <a:endParaRPr lang="en-US" sz="2400" dirty="0" smtClean="0">
+            <a:endParaRPr lang="en-US" sz="2400" dirty="0">
               <a:latin typeface="Arial" pitchFamily="34" charset="0"/>
               <a:cs typeface="Arial" pitchFamily="34" charset="0"/>
             </a:endParaRPr>
@@ -5008,10 +4924,9 @@
           <a:p>
             <a:pPr algn="ctr"/>
             <a:r>
-              <a:rPr lang="en-US" dirty="0" smtClean="0"/>
+              <a:rPr lang="en-US" dirty="0"/>
               <a:t>- space bar to continue - </a:t>
             </a:r>
-            <a:endParaRPr lang="en-US" dirty="0"/>
           </a:p>
         </p:txBody>
       </p:sp>
@@ -5071,35 +4986,35 @@
               <a:buNone/>
             </a:pPr>
             <a:r>
-              <a:rPr lang="en-US" sz="2000" dirty="0" smtClean="0">
+              <a:rPr lang="en-US" sz="2000" dirty="0">
                 <a:latin typeface="Arial" pitchFamily="34" charset="0"/>
                 <a:cs typeface="Arial" pitchFamily="34" charset="0"/>
               </a:rPr>
               <a:t>In the LOSS condition, on any trial, if you choose to invest in the </a:t>
             </a:r>
             <a:r>
-              <a:rPr lang="en-US" sz="2000" b="1" dirty="0" smtClean="0">
+              <a:rPr lang="en-US" sz="2000" b="1" dirty="0">
                 <a:latin typeface="Arial" pitchFamily="34" charset="0"/>
                 <a:cs typeface="Arial" pitchFamily="34" charset="0"/>
               </a:rPr>
               <a:t>bond</a:t>
             </a:r>
             <a:r>
-              <a:rPr lang="en-US" sz="2000" dirty="0" smtClean="0">
+              <a:rPr lang="en-US" sz="2000" dirty="0">
                 <a:latin typeface="Arial" pitchFamily="34" charset="0"/>
                 <a:cs typeface="Arial" pitchFamily="34" charset="0"/>
               </a:rPr>
               <a:t>, you get a payoff of -$6 for sure at the end of the trial. If you choose to invest in the </a:t>
             </a:r>
             <a:r>
-              <a:rPr lang="en-US" sz="2000" b="1" dirty="0" smtClean="0">
+              <a:rPr lang="en-US" sz="2000" b="1" dirty="0">
                 <a:latin typeface="Arial" pitchFamily="34" charset="0"/>
                 <a:cs typeface="Arial" pitchFamily="34" charset="0"/>
               </a:rPr>
               <a:t>stock</a:t>
             </a:r>
             <a:r>
-              <a:rPr lang="en-US" sz="2000" dirty="0" smtClean="0">
+              <a:rPr lang="en-US" sz="2000" dirty="0">
                 <a:latin typeface="Arial" pitchFamily="34" charset="0"/>
                 <a:cs typeface="Arial" pitchFamily="34" charset="0"/>
               </a:rPr>
@@ -5110,158 +5025,154 @@
             <a:pPr marL="0" indent="0">
               <a:buNone/>
             </a:pPr>
-            <a:endParaRPr lang="en-US" sz="2000" dirty="0" smtClean="0">
-              <a:latin typeface="Arial" pitchFamily="34" charset="0"/>
-              <a:cs typeface="Arial" pitchFamily="34" charset="0"/>
-            </a:endParaRPr>
-          </a:p>
-          <a:p>
-            <a:pPr marL="0" indent="0">
-              <a:buNone/>
-            </a:pPr>
-            <a:r>
-              <a:rPr lang="en-US" sz="2000" dirty="0" smtClean="0">
-                <a:latin typeface="Arial" pitchFamily="34" charset="0"/>
-                <a:cs typeface="Arial" pitchFamily="34" charset="0"/>
-              </a:rPr>
-              <a:t>The stock can either be </a:t>
-            </a:r>
-            <a:r>
-              <a:rPr lang="en-US" sz="2000" dirty="0" smtClean="0">
-                <a:solidFill>
-                  <a:srgbClr val="008000"/>
-                </a:solidFill>
-                <a:latin typeface="Arial" pitchFamily="34" charset="0"/>
-                <a:cs typeface="Arial" pitchFamily="34" charset="0"/>
-              </a:rPr>
-              <a:t>good</a:t>
-            </a:r>
-            <a:r>
-              <a:rPr lang="en-US" sz="2000" dirty="0" smtClean="0">
-                <a:latin typeface="Arial" pitchFamily="34" charset="0"/>
-                <a:cs typeface="Arial" pitchFamily="34" charset="0"/>
-              </a:rPr>
-              <a:t> or </a:t>
-            </a:r>
-            <a:r>
-              <a:rPr lang="en-US" sz="2000" dirty="0" smtClean="0">
-                <a:solidFill>
-                  <a:srgbClr val="FF0000"/>
-                </a:solidFill>
-                <a:latin typeface="Arial" pitchFamily="34" charset="0"/>
-                <a:cs typeface="Arial" pitchFamily="34" charset="0"/>
-              </a:rPr>
-              <a:t>bad</a:t>
-            </a:r>
-            <a:r>
-              <a:rPr lang="en-US" sz="2000" dirty="0" smtClean="0">
-                <a:latin typeface="Arial" pitchFamily="34" charset="0"/>
-                <a:cs typeface="Arial" pitchFamily="34" charset="0"/>
-              </a:rPr>
-              <a:t>, and this will determine the likelihood of its dividend being high or low. In the LOSS condition, if the </a:t>
-            </a:r>
-            <a:r>
-              <a:rPr lang="en-US" sz="2000" b="1" dirty="0" smtClean="0">
-                <a:latin typeface="Arial" pitchFamily="34" charset="0"/>
-                <a:cs typeface="Arial" pitchFamily="34" charset="0"/>
-              </a:rPr>
-              <a:t>stock</a:t>
-            </a:r>
-            <a:r>
-              <a:rPr lang="en-US" sz="2000" dirty="0" smtClean="0">
-                <a:latin typeface="Arial" pitchFamily="34" charset="0"/>
-                <a:cs typeface="Arial" pitchFamily="34" charset="0"/>
-              </a:rPr>
-              <a:t> is </a:t>
-            </a:r>
-            <a:r>
-              <a:rPr lang="en-US" sz="2000" dirty="0" smtClean="0">
-                <a:solidFill>
-                  <a:srgbClr val="008000"/>
-                </a:solidFill>
-                <a:latin typeface="Arial" pitchFamily="34" charset="0"/>
-                <a:cs typeface="Arial" pitchFamily="34" charset="0"/>
-              </a:rPr>
-              <a:t>good</a:t>
-            </a:r>
-            <a:r>
-              <a:rPr lang="en-US" sz="2000" dirty="0" smtClean="0">
-                <a:latin typeface="Arial" pitchFamily="34" charset="0"/>
-                <a:cs typeface="Arial" pitchFamily="34" charset="0"/>
-              </a:rPr>
-              <a:t> then the probability of receiving the -$10 dividend is 30% and the probability of receiving the -$2 dividend is 70%. </a:t>
-            </a:r>
-          </a:p>
-          <a:p>
-            <a:pPr marL="0" indent="0">
-              <a:buNone/>
-            </a:pPr>
-            <a:endParaRPr lang="en-US" sz="2000" dirty="0" smtClean="0">
-              <a:latin typeface="Arial" pitchFamily="34" charset="0"/>
-              <a:cs typeface="Arial" pitchFamily="34" charset="0"/>
-            </a:endParaRPr>
-          </a:p>
-          <a:p>
-            <a:pPr marL="0" indent="0">
-              <a:buNone/>
-            </a:pPr>
-            <a:r>
-              <a:rPr lang="en-US" sz="2000" dirty="0" smtClean="0">
-                <a:latin typeface="Arial" pitchFamily="34" charset="0"/>
-                <a:cs typeface="Arial" pitchFamily="34" charset="0"/>
-              </a:rPr>
-              <a:t>The dividends paid by this </a:t>
-            </a:r>
-            <a:r>
-              <a:rPr lang="en-US" sz="2000" b="1" dirty="0" smtClean="0">
-                <a:latin typeface="Arial" pitchFamily="34" charset="0"/>
-                <a:cs typeface="Arial" pitchFamily="34" charset="0"/>
-              </a:rPr>
-              <a:t>stock</a:t>
-            </a:r>
-            <a:r>
-              <a:rPr lang="en-US" sz="2000" dirty="0" smtClean="0">
-                <a:latin typeface="Arial" pitchFamily="34" charset="0"/>
-                <a:cs typeface="Arial" pitchFamily="34" charset="0"/>
-              </a:rPr>
-              <a:t> are independent from trial to trial, but come from this exact distribution. In other words, once it is determined by the computer that the </a:t>
-            </a:r>
-            <a:r>
-              <a:rPr lang="en-US" sz="2000" b="1" dirty="0" smtClean="0">
-                <a:latin typeface="Arial" pitchFamily="34" charset="0"/>
-                <a:cs typeface="Arial" pitchFamily="34" charset="0"/>
-              </a:rPr>
-              <a:t>stock</a:t>
-            </a:r>
-            <a:r>
-              <a:rPr lang="en-US" sz="2000" dirty="0" smtClean="0">
-                <a:latin typeface="Arial" pitchFamily="34" charset="0"/>
-                <a:cs typeface="Arial" pitchFamily="34" charset="0"/>
-              </a:rPr>
-              <a:t> is </a:t>
-            </a:r>
-            <a:r>
-              <a:rPr lang="en-US" sz="2000" dirty="0" smtClean="0">
-                <a:solidFill>
-                  <a:srgbClr val="008000"/>
-                </a:solidFill>
-                <a:latin typeface="Arial" pitchFamily="34" charset="0"/>
-                <a:cs typeface="Arial" pitchFamily="34" charset="0"/>
-              </a:rPr>
-              <a:t>good</a:t>
-            </a:r>
-            <a:r>
-              <a:rPr lang="en-US" sz="2000" dirty="0" smtClean="0">
-                <a:latin typeface="Arial" pitchFamily="34" charset="0"/>
-                <a:cs typeface="Arial" pitchFamily="34" charset="0"/>
-              </a:rPr>
-              <a:t>, then on each trial the odds of the dividend being -$10 are 30%, and the odds of it being -$2 are 70%.</a:t>
-            </a:r>
             <a:endParaRPr lang="en-US" sz="2000" dirty="0">
               <a:latin typeface="Arial" pitchFamily="34" charset="0"/>
               <a:cs typeface="Arial" pitchFamily="34" charset="0"/>
             </a:endParaRPr>
           </a:p>
+          <a:p>
+            <a:pPr marL="0" indent="0">
+              <a:buNone/>
+            </a:pPr>
+            <a:r>
+              <a:rPr lang="en-US" sz="2000" dirty="0">
+                <a:latin typeface="Arial" pitchFamily="34" charset="0"/>
+                <a:cs typeface="Arial" pitchFamily="34" charset="0"/>
+              </a:rPr>
+              <a:t>The stock can either be </a:t>
+            </a:r>
+            <a:r>
+              <a:rPr lang="en-US" sz="2000" dirty="0">
+                <a:solidFill>
+                  <a:srgbClr val="008000"/>
+                </a:solidFill>
+                <a:latin typeface="Arial" pitchFamily="34" charset="0"/>
+                <a:cs typeface="Arial" pitchFamily="34" charset="0"/>
+              </a:rPr>
+              <a:t>good</a:t>
+            </a:r>
+            <a:r>
+              <a:rPr lang="en-US" sz="2000" dirty="0">
+                <a:latin typeface="Arial" pitchFamily="34" charset="0"/>
+                <a:cs typeface="Arial" pitchFamily="34" charset="0"/>
+              </a:rPr>
+              <a:t> or </a:t>
+            </a:r>
+            <a:r>
+              <a:rPr lang="en-US" sz="2000" dirty="0">
+                <a:solidFill>
+                  <a:srgbClr val="FF0000"/>
+                </a:solidFill>
+                <a:latin typeface="Arial" pitchFamily="34" charset="0"/>
+                <a:cs typeface="Arial" pitchFamily="34" charset="0"/>
+              </a:rPr>
+              <a:t>bad</a:t>
+            </a:r>
+            <a:r>
+              <a:rPr lang="en-US" sz="2000" dirty="0">
+                <a:latin typeface="Arial" pitchFamily="34" charset="0"/>
+                <a:cs typeface="Arial" pitchFamily="34" charset="0"/>
+              </a:rPr>
+              <a:t>, and this will determine the likelihood of its dividend being high or low. In the LOSS condition, if the </a:t>
+            </a:r>
+            <a:r>
+              <a:rPr lang="en-US" sz="2000" b="1" dirty="0">
+                <a:latin typeface="Arial" pitchFamily="34" charset="0"/>
+                <a:cs typeface="Arial" pitchFamily="34" charset="0"/>
+              </a:rPr>
+              <a:t>stock</a:t>
+            </a:r>
+            <a:r>
+              <a:rPr lang="en-US" sz="2000" dirty="0">
+                <a:latin typeface="Arial" pitchFamily="34" charset="0"/>
+                <a:cs typeface="Arial" pitchFamily="34" charset="0"/>
+              </a:rPr>
+              <a:t> is </a:t>
+            </a:r>
+            <a:r>
+              <a:rPr lang="en-US" sz="2000" dirty="0">
+                <a:solidFill>
+                  <a:srgbClr val="008000"/>
+                </a:solidFill>
+                <a:latin typeface="Arial" pitchFamily="34" charset="0"/>
+                <a:cs typeface="Arial" pitchFamily="34" charset="0"/>
+              </a:rPr>
+              <a:t>good</a:t>
+            </a:r>
+            <a:r>
+              <a:rPr lang="en-US" sz="2000" dirty="0">
+                <a:latin typeface="Arial" pitchFamily="34" charset="0"/>
+                <a:cs typeface="Arial" pitchFamily="34" charset="0"/>
+              </a:rPr>
+              <a:t> then the probability of receiving the -$10 dividend is 30% and the probability of receiving the -$2 dividend is 70%. </a:t>
+            </a:r>
+          </a:p>
+          <a:p>
+            <a:pPr marL="0" indent="0">
+              <a:buNone/>
+            </a:pPr>
+            <a:endParaRPr lang="en-US" sz="2000" dirty="0">
+              <a:latin typeface="Arial" pitchFamily="34" charset="0"/>
+              <a:cs typeface="Arial" pitchFamily="34" charset="0"/>
+            </a:endParaRPr>
+          </a:p>
+          <a:p>
+            <a:pPr marL="0" indent="0">
+              <a:buNone/>
+            </a:pPr>
+            <a:r>
+              <a:rPr lang="en-US" sz="2000" dirty="0">
+                <a:latin typeface="Arial" pitchFamily="34" charset="0"/>
+                <a:cs typeface="Arial" pitchFamily="34" charset="0"/>
+              </a:rPr>
+              <a:t>The dividends paid by this </a:t>
+            </a:r>
+            <a:r>
+              <a:rPr lang="en-US" sz="2000" b="1" dirty="0">
+                <a:latin typeface="Arial" pitchFamily="34" charset="0"/>
+                <a:cs typeface="Arial" pitchFamily="34" charset="0"/>
+              </a:rPr>
+              <a:t>stock</a:t>
+            </a:r>
+            <a:r>
+              <a:rPr lang="en-US" sz="2000" dirty="0">
+                <a:latin typeface="Arial" pitchFamily="34" charset="0"/>
+                <a:cs typeface="Arial" pitchFamily="34" charset="0"/>
+              </a:rPr>
+              <a:t> are independent from trial to trial, but come from this exact distribution. In other words, once it is determined by the computer that the </a:t>
+            </a:r>
+            <a:r>
+              <a:rPr lang="en-US" sz="2000" b="1" dirty="0">
+                <a:latin typeface="Arial" pitchFamily="34" charset="0"/>
+                <a:cs typeface="Arial" pitchFamily="34" charset="0"/>
+              </a:rPr>
+              <a:t>stock</a:t>
+            </a:r>
+            <a:r>
+              <a:rPr lang="en-US" sz="2000" dirty="0">
+                <a:latin typeface="Arial" pitchFamily="34" charset="0"/>
+                <a:cs typeface="Arial" pitchFamily="34" charset="0"/>
+              </a:rPr>
+              <a:t> is </a:t>
+            </a:r>
+            <a:r>
+              <a:rPr lang="en-US" sz="2000" dirty="0">
+                <a:solidFill>
+                  <a:srgbClr val="008000"/>
+                </a:solidFill>
+                <a:latin typeface="Arial" pitchFamily="34" charset="0"/>
+                <a:cs typeface="Arial" pitchFamily="34" charset="0"/>
+              </a:rPr>
+              <a:t>good</a:t>
+            </a:r>
+            <a:r>
+              <a:rPr lang="en-US" sz="2000" dirty="0">
+                <a:latin typeface="Arial" pitchFamily="34" charset="0"/>
+                <a:cs typeface="Arial" pitchFamily="34" charset="0"/>
+              </a:rPr>
+              <a:t>, then on each trial the odds of the dividend being -$10 are 30%, and the odds of it being -$2 are 70%.</a:t>
+            </a:r>
+          </a:p>
         </p:txBody>
       </p:sp>
       <p:sp>
@@ -5288,10 +5199,9 @@
           <a:p>
             <a:pPr algn="ctr"/>
             <a:r>
-              <a:rPr lang="en-US" dirty="0" smtClean="0"/>
+              <a:rPr lang="en-US" dirty="0"/>
               <a:t>- space bar to continue - </a:t>
             </a:r>
-            <a:endParaRPr lang="en-US" dirty="0"/>
           </a:p>
         </p:txBody>
       </p:sp>
@@ -5418,13 +5328,8 @@
             <a:pPr algn="ctr"/>
             <a:r>
               <a:rPr lang="en-US" sz="1200" dirty="0"/>
-              <a:t>S</a:t>
-            </a:r>
-            <a:r>
-              <a:rPr lang="en-US" sz="1200" dirty="0" smtClean="0"/>
-              <a:t>tock</a:t>
-            </a:r>
-            <a:endParaRPr lang="en-US" sz="1200" dirty="0"/>
+              <a:t>Stock</a:t>
+            </a:r>
           </a:p>
         </p:txBody>
       </p:sp>
@@ -5453,13 +5358,8 @@
             <a:pPr algn="ctr"/>
             <a:r>
               <a:rPr lang="en-US" sz="1200" dirty="0"/>
-              <a:t>B</a:t>
-            </a:r>
-            <a:r>
-              <a:rPr lang="en-US" sz="1200" dirty="0" smtClean="0"/>
-              <a:t>ond</a:t>
-            </a:r>
-            <a:endParaRPr lang="en-US" sz="1200" dirty="0"/>
+              <a:t>Bond</a:t>
+            </a:r>
           </a:p>
         </p:txBody>
       </p:sp>
@@ -5487,17 +5387,16 @@
           <a:p>
             <a:pPr algn="ctr"/>
             <a:r>
-              <a:rPr lang="en-US" sz="1100" dirty="0" smtClean="0"/>
+              <a:rPr lang="en-US" sz="1100" dirty="0"/>
               <a:t>Payoff </a:t>
             </a:r>
           </a:p>
           <a:p>
             <a:pPr algn="ctr"/>
             <a:r>
-              <a:rPr lang="en-US" sz="1100" dirty="0" smtClean="0"/>
+              <a:rPr lang="en-US" sz="1100" dirty="0"/>
               <a:t>-$10 or -$2</a:t>
             </a:r>
-            <a:endParaRPr lang="en-US" sz="1100" dirty="0"/>
           </a:p>
         </p:txBody>
       </p:sp>
@@ -5525,17 +5424,16 @@
           <a:p>
             <a:pPr algn="ctr"/>
             <a:r>
-              <a:rPr lang="en-US" sz="1100" dirty="0" smtClean="0"/>
+              <a:rPr lang="en-US" sz="1100" dirty="0"/>
               <a:t>Payoff </a:t>
             </a:r>
           </a:p>
           <a:p>
             <a:pPr algn="ctr"/>
             <a:r>
-              <a:rPr lang="en-US" sz="1100" dirty="0" smtClean="0"/>
+              <a:rPr lang="en-US" sz="1100" dirty="0"/>
               <a:t>-$6</a:t>
             </a:r>
-            <a:endParaRPr lang="en-US" sz="1100" dirty="0"/>
           </a:p>
         </p:txBody>
       </p:sp>
@@ -5562,10 +5460,9 @@
           <a:lstStyle/>
           <a:p>
             <a:r>
-              <a:rPr lang="en-US" dirty="0" smtClean="0"/>
+              <a:rPr lang="en-US" dirty="0"/>
               <a:t>Example </a:t>
             </a:r>
-            <a:endParaRPr lang="en-US" dirty="0"/>
           </a:p>
         </p:txBody>
       </p:sp>
@@ -5670,28 +5567,28 @@
               <a:buNone/>
             </a:pPr>
             <a:r>
-              <a:rPr lang="en-US" sz="2400" dirty="0" smtClean="0">
+              <a:rPr lang="en-US" sz="2400" dirty="0">
                 <a:latin typeface="Arial" pitchFamily="34" charset="0"/>
                 <a:cs typeface="Arial" pitchFamily="34" charset="0"/>
               </a:rPr>
               <a:t>In the LOSS condition, if the </a:t>
             </a:r>
             <a:r>
-              <a:rPr lang="en-US" sz="2400" b="1" dirty="0" smtClean="0">
+              <a:rPr lang="en-US" sz="2400" b="1" dirty="0">
                 <a:latin typeface="Arial" pitchFamily="34" charset="0"/>
                 <a:cs typeface="Arial" pitchFamily="34" charset="0"/>
               </a:rPr>
               <a:t>stock</a:t>
             </a:r>
             <a:r>
-              <a:rPr lang="en-US" sz="2400" dirty="0" smtClean="0">
+              <a:rPr lang="en-US" sz="2400" dirty="0">
                 <a:latin typeface="Arial" pitchFamily="34" charset="0"/>
                 <a:cs typeface="Arial" pitchFamily="34" charset="0"/>
               </a:rPr>
               <a:t> is </a:t>
             </a:r>
             <a:r>
-              <a:rPr lang="en-US" sz="2400" dirty="0" smtClean="0">
+              <a:rPr lang="en-US" sz="2400" dirty="0">
                 <a:solidFill>
                   <a:srgbClr val="FF0000"/>
                 </a:solidFill>
@@ -5701,7 +5598,7 @@
               <a:t>bad</a:t>
             </a:r>
             <a:r>
-              <a:rPr lang="en-US" sz="2400" dirty="0" smtClean="0">
+              <a:rPr lang="en-US" sz="2400" dirty="0">
                 <a:latin typeface="Arial" pitchFamily="34" charset="0"/>
                 <a:cs typeface="Arial" pitchFamily="34" charset="0"/>
               </a:rPr>
@@ -5712,7 +5609,7 @@
             <a:pPr marL="0" indent="0">
               <a:buNone/>
             </a:pPr>
-            <a:endParaRPr lang="en-US" sz="2400" dirty="0" smtClean="0">
+            <a:endParaRPr lang="en-US" sz="2400" dirty="0">
               <a:latin typeface="Arial" pitchFamily="34" charset="0"/>
               <a:cs typeface="Arial" pitchFamily="34" charset="0"/>
             </a:endParaRPr>
@@ -5722,18 +5619,11 @@
               <a:buNone/>
             </a:pPr>
             <a:r>
-              <a:rPr lang="en-US" sz="2400" dirty="0" smtClean="0">
-                <a:latin typeface="Arial" pitchFamily="34" charset="0"/>
-                <a:cs typeface="Arial" pitchFamily="34" charset="0"/>
-              </a:rPr>
-              <a:t>Again, once </a:t>
-            </a:r>
-            <a:r>
               <a:rPr lang="en-US" sz="2400" dirty="0">
                 <a:latin typeface="Arial" pitchFamily="34" charset="0"/>
                 <a:cs typeface="Arial" pitchFamily="34" charset="0"/>
               </a:rPr>
-              <a:t>the computer determines that the </a:t>
+              <a:t>Again, once the computer determines that the </a:t>
             </a:r>
             <a:r>
               <a:rPr lang="en-US" sz="2400" b="1" dirty="0">
@@ -5781,15 +5671,13 @@
                 <a:latin typeface="Arial" pitchFamily="34" charset="0"/>
                 <a:cs typeface="Arial" pitchFamily="34" charset="0"/>
               </a:rPr>
-              <a:t>, that is maintained on each </a:t>
-            </a:r>
-            <a:r>
-              <a:rPr lang="en-US" sz="2400" dirty="0" smtClean="0">
-                <a:latin typeface="Arial" pitchFamily="34" charset="0"/>
-                <a:cs typeface="Arial" pitchFamily="34" charset="0"/>
-              </a:rPr>
-              <a:t>trial within the block.</a:t>
-            </a:r>
+              <a:t>, that is maintained on each trial within the block.</a:t>
+            </a:r>
+          </a:p>
+          <a:p>
+            <a:pPr marL="0" indent="0">
+              <a:buNone/>
+            </a:pPr>
             <a:endParaRPr lang="en-US" sz="2400" dirty="0">
               <a:latin typeface="Arial" pitchFamily="34" charset="0"/>
               <a:cs typeface="Arial" pitchFamily="34" charset="0"/>
@@ -5799,15 +5687,6 @@
             <a:pPr marL="0" indent="0">
               <a:buNone/>
             </a:pPr>
-            <a:endParaRPr lang="en-US" sz="2400" dirty="0" smtClean="0">
-              <a:latin typeface="Arial" pitchFamily="34" charset="0"/>
-              <a:cs typeface="Arial" pitchFamily="34" charset="0"/>
-            </a:endParaRPr>
-          </a:p>
-          <a:p>
-            <a:pPr marL="0" indent="0">
-              <a:buNone/>
-            </a:pPr>
             <a:endParaRPr lang="en-US" dirty="0"/>
           </a:p>
         </p:txBody>
@@ -5836,10 +5715,9 @@
           <a:p>
             <a:pPr algn="ctr"/>
             <a:r>
-              <a:rPr lang="en-US" dirty="0" smtClean="0"/>
+              <a:rPr lang="en-US" dirty="0"/>
               <a:t>- space bar to continue - </a:t>
             </a:r>
-            <a:endParaRPr lang="en-US" dirty="0"/>
           </a:p>
         </p:txBody>
       </p:sp>
@@ -5899,7 +5777,7 @@
               <a:buNone/>
             </a:pPr>
             <a:r>
-              <a:rPr lang="en-US" sz="2000" dirty="0" smtClean="0">
+              <a:rPr lang="en-US" sz="2000" dirty="0">
                 <a:latin typeface="Arial" pitchFamily="34" charset="0"/>
                 <a:cs typeface="Arial" pitchFamily="34" charset="0"/>
               </a:rPr>
@@ -5911,28 +5789,28 @@
               <a:buNone/>
             </a:pPr>
             <a:r>
-              <a:rPr lang="en-US" sz="2000" dirty="0" smtClean="0">
+              <a:rPr lang="en-US" sz="2000" dirty="0">
                 <a:latin typeface="Arial" pitchFamily="34" charset="0"/>
                 <a:cs typeface="Arial" pitchFamily="34" charset="0"/>
               </a:rPr>
               <a:t>At the beginning of each block of 6 trials, you will not know which type of </a:t>
             </a:r>
             <a:r>
-              <a:rPr lang="en-US" sz="2000" b="1" dirty="0" smtClean="0">
+              <a:rPr lang="en-US" sz="2000" b="1" dirty="0">
                 <a:latin typeface="Arial" pitchFamily="34" charset="0"/>
                 <a:cs typeface="Arial" pitchFamily="34" charset="0"/>
               </a:rPr>
               <a:t>stock </a:t>
             </a:r>
             <a:r>
-              <a:rPr lang="en-US" sz="2000" dirty="0" smtClean="0">
+              <a:rPr lang="en-US" sz="2000" dirty="0">
                 <a:latin typeface="Arial" pitchFamily="34" charset="0"/>
                 <a:cs typeface="Arial" pitchFamily="34" charset="0"/>
               </a:rPr>
               <a:t>the computer selected for that block. You may be facing a </a:t>
             </a:r>
             <a:r>
-              <a:rPr lang="en-US" sz="2000" dirty="0" smtClean="0">
+              <a:rPr lang="en-US" sz="2000" dirty="0">
                 <a:solidFill>
                   <a:srgbClr val="008000"/>
                 </a:solidFill>
@@ -5942,28 +5820,28 @@
               <a:t>good</a:t>
             </a:r>
             <a:r>
-              <a:rPr lang="en-US" sz="2000" dirty="0" smtClean="0">
+              <a:rPr lang="en-US" sz="2000" dirty="0">
                 <a:latin typeface="Arial" pitchFamily="34" charset="0"/>
                 <a:cs typeface="Arial" pitchFamily="34" charset="0"/>
               </a:rPr>
               <a:t> </a:t>
             </a:r>
             <a:r>
-              <a:rPr lang="en-US" sz="2000" b="1" dirty="0" smtClean="0">
+              <a:rPr lang="en-US" sz="2000" b="1" dirty="0">
                 <a:latin typeface="Arial" pitchFamily="34" charset="0"/>
                 <a:cs typeface="Arial" pitchFamily="34" charset="0"/>
               </a:rPr>
               <a:t>stock</a:t>
             </a:r>
             <a:r>
-              <a:rPr lang="en-US" sz="2000" dirty="0" smtClean="0">
+              <a:rPr lang="en-US" sz="2000" dirty="0">
                 <a:latin typeface="Arial" pitchFamily="34" charset="0"/>
                 <a:cs typeface="Arial" pitchFamily="34" charset="0"/>
               </a:rPr>
               <a:t> or the </a:t>
             </a:r>
             <a:r>
-              <a:rPr lang="en-US" sz="2000" dirty="0" smtClean="0">
+              <a:rPr lang="en-US" sz="2000" dirty="0">
                 <a:solidFill>
                   <a:srgbClr val="FF0000"/>
                 </a:solidFill>
@@ -5973,49 +5851,49 @@
               <a:t>bad</a:t>
             </a:r>
             <a:r>
-              <a:rPr lang="en-US" sz="2000" dirty="0" smtClean="0">
+              <a:rPr lang="en-US" sz="2000" dirty="0">
                 <a:latin typeface="Arial" pitchFamily="34" charset="0"/>
                 <a:cs typeface="Arial" pitchFamily="34" charset="0"/>
               </a:rPr>
               <a:t> </a:t>
             </a:r>
             <a:r>
-              <a:rPr lang="en-US" sz="2000" b="1" dirty="0" smtClean="0">
+              <a:rPr lang="en-US" sz="2000" b="1" dirty="0">
                 <a:latin typeface="Arial" pitchFamily="34" charset="0"/>
                 <a:cs typeface="Arial" pitchFamily="34" charset="0"/>
               </a:rPr>
               <a:t>stock</a:t>
             </a:r>
             <a:r>
-              <a:rPr lang="en-US" sz="2000" dirty="0" smtClean="0">
+              <a:rPr lang="en-US" sz="2000" dirty="0">
                 <a:latin typeface="Arial" pitchFamily="34" charset="0"/>
                 <a:cs typeface="Arial" pitchFamily="34" charset="0"/>
               </a:rPr>
               <a:t>, with equal probability. On each trial’s choice phase, you will decide whether you want to invest in the </a:t>
             </a:r>
             <a:r>
-              <a:rPr lang="en-US" sz="2000" b="1" dirty="0" smtClean="0">
+              <a:rPr lang="en-US" sz="2000" b="1" dirty="0">
                 <a:latin typeface="Arial" pitchFamily="34" charset="0"/>
                 <a:cs typeface="Arial" pitchFamily="34" charset="0"/>
               </a:rPr>
               <a:t>stock</a:t>
             </a:r>
             <a:r>
-              <a:rPr lang="en-US" sz="2000" dirty="0" smtClean="0">
+              <a:rPr lang="en-US" sz="2000" dirty="0">
                 <a:latin typeface="Arial" pitchFamily="34" charset="0"/>
                 <a:cs typeface="Arial" pitchFamily="34" charset="0"/>
               </a:rPr>
               <a:t> (and accumulate the dividend paid by the stock), or the </a:t>
             </a:r>
             <a:r>
-              <a:rPr lang="en-US" sz="2000" b="1" dirty="0" smtClean="0">
+              <a:rPr lang="en-US" sz="2000" b="1" dirty="0">
                 <a:latin typeface="Arial" pitchFamily="34" charset="0"/>
                 <a:cs typeface="Arial" pitchFamily="34" charset="0"/>
               </a:rPr>
               <a:t>bond</a:t>
             </a:r>
             <a:r>
-              <a:rPr lang="en-US" sz="2000" dirty="0" smtClean="0">
+              <a:rPr lang="en-US" sz="2000" dirty="0">
                 <a:latin typeface="Arial" pitchFamily="34" charset="0"/>
                 <a:cs typeface="Arial" pitchFamily="34" charset="0"/>
               </a:rPr>
@@ -6035,85 +5913,10 @@
             <a:pPr marL="0" indent="0">
               <a:buNone/>
             </a:pPr>
-            <a:endParaRPr lang="en-US" sz="2000" dirty="0" smtClean="0">
+            <a:endParaRPr lang="en-US" sz="2000" dirty="0">
               <a:latin typeface="Arial" pitchFamily="34" charset="0"/>
               <a:cs typeface="Arial" pitchFamily="34" charset="0"/>
             </a:endParaRPr>
-          </a:p>
-          <a:p>
-            <a:pPr marL="0" indent="0">
-              <a:buNone/>
-            </a:pPr>
-            <a:endParaRPr lang="en-US" sz="2000" dirty="0" smtClean="0">
-              <a:latin typeface="Arial" pitchFamily="34" charset="0"/>
-              <a:cs typeface="Arial" pitchFamily="34" charset="0"/>
-            </a:endParaRPr>
-          </a:p>
-          <a:p>
-            <a:pPr marL="0" indent="0" algn="ctr">
-              <a:buNone/>
-            </a:pPr>
-            <a:r>
-              <a:rPr lang="en-US" sz="2000" dirty="0" smtClean="0">
-                <a:latin typeface="Arial" pitchFamily="34" charset="0"/>
-                <a:cs typeface="Arial" pitchFamily="34" charset="0"/>
-              </a:rPr>
-              <a:t>Stock Payout Phase</a:t>
-            </a:r>
-          </a:p>
-          <a:p>
-            <a:pPr marL="0" indent="0">
-              <a:buNone/>
-            </a:pPr>
-            <a:r>
-              <a:rPr lang="en-US" sz="2000" dirty="0" smtClean="0">
-                <a:latin typeface="Arial" pitchFamily="34" charset="0"/>
-                <a:cs typeface="Arial" pitchFamily="34" charset="0"/>
-              </a:rPr>
-              <a:t>Then, a stockbroker will tell you the dividend amount paid by the </a:t>
-            </a:r>
-            <a:r>
-              <a:rPr lang="en-US" sz="2000" b="1" dirty="0" smtClean="0">
-                <a:latin typeface="Arial" pitchFamily="34" charset="0"/>
-                <a:cs typeface="Arial" pitchFamily="34" charset="0"/>
-              </a:rPr>
-              <a:t>stock</a:t>
-            </a:r>
-            <a:r>
-              <a:rPr lang="en-US" sz="2000" dirty="0" smtClean="0">
-                <a:latin typeface="Arial" pitchFamily="34" charset="0"/>
-                <a:cs typeface="Arial" pitchFamily="34" charset="0"/>
-              </a:rPr>
-              <a:t> – no matter if you chose the </a:t>
-            </a:r>
-            <a:r>
-              <a:rPr lang="en-US" sz="2000" b="1" dirty="0" smtClean="0">
-                <a:latin typeface="Arial" pitchFamily="34" charset="0"/>
-                <a:cs typeface="Arial" pitchFamily="34" charset="0"/>
-              </a:rPr>
-              <a:t>stock</a:t>
-            </a:r>
-            <a:r>
-              <a:rPr lang="en-US" sz="2000" dirty="0" smtClean="0">
-                <a:latin typeface="Arial" pitchFamily="34" charset="0"/>
-                <a:cs typeface="Arial" pitchFamily="34" charset="0"/>
-              </a:rPr>
-              <a:t> or the </a:t>
-            </a:r>
-            <a:r>
-              <a:rPr lang="en-US" sz="2000" b="1" dirty="0" smtClean="0">
-                <a:latin typeface="Arial" pitchFamily="34" charset="0"/>
-                <a:cs typeface="Arial" pitchFamily="34" charset="0"/>
-              </a:rPr>
-              <a:t>bond</a:t>
-            </a:r>
-            <a:r>
-              <a:rPr lang="en-US" sz="2000" dirty="0" smtClean="0">
-                <a:latin typeface="Arial" pitchFamily="34" charset="0"/>
-                <a:cs typeface="Arial" pitchFamily="34" charset="0"/>
-              </a:rPr>
-              <a:t>. To show us you’re paying attention to this phase, we ask that you tell us the gender of the stockbroker by making a button response. </a:t>
-            </a:r>
           </a:p>
           <a:p>
             <a:pPr marL="0" indent="0">
@@ -6124,6 +5927,81 @@
               <a:cs typeface="Arial" pitchFamily="34" charset="0"/>
             </a:endParaRPr>
           </a:p>
+          <a:p>
+            <a:pPr marL="0" indent="0" algn="ctr">
+              <a:buNone/>
+            </a:pPr>
+            <a:r>
+              <a:rPr lang="en-US" sz="2000" dirty="0">
+                <a:latin typeface="Arial" pitchFamily="34" charset="0"/>
+                <a:cs typeface="Arial" pitchFamily="34" charset="0"/>
+              </a:rPr>
+              <a:t>Stock Payout Phase</a:t>
+            </a:r>
+          </a:p>
+          <a:p>
+            <a:pPr marL="0" indent="0">
+              <a:buNone/>
+            </a:pPr>
+            <a:r>
+              <a:rPr lang="en-US" sz="2000" dirty="0">
+                <a:latin typeface="Arial" pitchFamily="34" charset="0"/>
+                <a:cs typeface="Arial" pitchFamily="34" charset="0"/>
+              </a:rPr>
+              <a:t>Then, a stockbroker will tell you the dividend amount paid by the </a:t>
+            </a:r>
+            <a:r>
+              <a:rPr lang="en-US" sz="2000" b="1" dirty="0">
+                <a:latin typeface="Arial" pitchFamily="34" charset="0"/>
+                <a:cs typeface="Arial" pitchFamily="34" charset="0"/>
+              </a:rPr>
+              <a:t>stock</a:t>
+            </a:r>
+            <a:r>
+              <a:rPr lang="en-US" sz="2000" dirty="0">
+                <a:latin typeface="Arial" pitchFamily="34" charset="0"/>
+                <a:cs typeface="Arial" pitchFamily="34" charset="0"/>
+              </a:rPr>
+              <a:t> – no matter if you chose the </a:t>
+            </a:r>
+            <a:r>
+              <a:rPr lang="en-US" sz="2000" b="1" dirty="0">
+                <a:latin typeface="Arial" pitchFamily="34" charset="0"/>
+                <a:cs typeface="Arial" pitchFamily="34" charset="0"/>
+              </a:rPr>
+              <a:t>stock</a:t>
+            </a:r>
+            <a:r>
+              <a:rPr lang="en-US" sz="2000" dirty="0">
+                <a:latin typeface="Arial" pitchFamily="34" charset="0"/>
+                <a:cs typeface="Arial" pitchFamily="34" charset="0"/>
+              </a:rPr>
+              <a:t> or the </a:t>
+            </a:r>
+            <a:r>
+              <a:rPr lang="en-US" sz="2000" b="1" dirty="0">
+                <a:latin typeface="Arial" pitchFamily="34" charset="0"/>
+                <a:cs typeface="Arial" pitchFamily="34" charset="0"/>
+              </a:rPr>
+              <a:t>bond</a:t>
+            </a:r>
+            <a:r>
+              <a:rPr lang="en-US" sz="2000" dirty="0">
+                <a:latin typeface="Arial" pitchFamily="34" charset="0"/>
+                <a:cs typeface="Arial" pitchFamily="34" charset="0"/>
+              </a:rPr>
+              <a:t>. To show us you’re paying attention to this phase, we ask that you tell us the gender of the stockbroker by making a button response. </a:t>
+            </a:r>
+          </a:p>
+          <a:p>
+            <a:pPr marL="0" indent="0">
+              <a:buNone/>
+            </a:pPr>
+            <a:endParaRPr lang="en-US" sz="2000" dirty="0">
+              <a:latin typeface="Arial" pitchFamily="34" charset="0"/>
+              <a:cs typeface="Arial" pitchFamily="34" charset="0"/>
+            </a:endParaRPr>
+          </a:p>
         </p:txBody>
       </p:sp>
       <p:sp>
@@ -6150,10 +6028,9 @@
           <a:p>
             <a:pPr algn="ctr"/>
             <a:r>
-              <a:rPr lang="en-US" dirty="0" smtClean="0"/>
+              <a:rPr lang="en-US" dirty="0"/>
               <a:t>- space bar to continue - </a:t>
             </a:r>
-            <a:endParaRPr lang="en-US" dirty="0"/>
           </a:p>
         </p:txBody>
       </p:sp>
@@ -6204,10 +6081,9 @@
           <a:lstStyle/>
           <a:p>
             <a:r>
-              <a:rPr lang="en-US" dirty="0" smtClean="0"/>
+              <a:rPr lang="en-US" dirty="0"/>
               <a:t>Example </a:t>
             </a:r>
-            <a:endParaRPr lang="en-US" dirty="0"/>
           </a:p>
         </p:txBody>
       </p:sp>
@@ -6303,10 +6179,9 @@
           <a:lstStyle/>
           <a:p>
             <a:r>
-              <a:rPr lang="en-US" dirty="0" smtClean="0"/>
+              <a:rPr lang="en-US" dirty="0"/>
               <a:t>Example </a:t>
             </a:r>
-            <a:endParaRPr lang="en-US" dirty="0"/>
           </a:p>
         </p:txBody>
       </p:sp>
@@ -6411,7 +6286,7 @@
               <a:buNone/>
             </a:pPr>
             <a:r>
-              <a:rPr lang="en-US" sz="1800" dirty="0" smtClean="0">
+              <a:rPr lang="en-US" sz="1800" dirty="0">
                 <a:solidFill>
                   <a:srgbClr val="008000"/>
                 </a:solidFill>
@@ -6421,7 +6296,7 @@
               <a:t>Good</a:t>
             </a:r>
             <a:r>
-              <a:rPr lang="en-US" sz="1800" dirty="0" smtClean="0">
+              <a:rPr lang="en-US" sz="1800" dirty="0">
                 <a:latin typeface="Arial" pitchFamily="34" charset="0"/>
                 <a:cs typeface="Arial" pitchFamily="34" charset="0"/>
               </a:rPr>
@@ -6433,28 +6308,28 @@
               <a:buNone/>
             </a:pPr>
             <a:r>
-              <a:rPr lang="en-US" sz="1800" dirty="0" smtClean="0">
+              <a:rPr lang="en-US" sz="1800" dirty="0">
                 <a:latin typeface="Arial" pitchFamily="34" charset="0"/>
                 <a:cs typeface="Arial" pitchFamily="34" charset="0"/>
               </a:rPr>
               <a:t>Then, we’ll ask you to estimate the probability that the current </a:t>
             </a:r>
             <a:r>
-              <a:rPr lang="en-US" sz="1800" b="1" dirty="0" smtClean="0">
+              <a:rPr lang="en-US" sz="1800" b="1" dirty="0">
                 <a:latin typeface="Arial" pitchFamily="34" charset="0"/>
                 <a:cs typeface="Arial" pitchFamily="34" charset="0"/>
               </a:rPr>
               <a:t>stock</a:t>
             </a:r>
             <a:r>
-              <a:rPr lang="en-US" sz="1800" dirty="0" smtClean="0">
+              <a:rPr lang="en-US" sz="1800" dirty="0">
                 <a:latin typeface="Arial" pitchFamily="34" charset="0"/>
                 <a:cs typeface="Arial" pitchFamily="34" charset="0"/>
               </a:rPr>
               <a:t> is a </a:t>
             </a:r>
             <a:r>
-              <a:rPr lang="en-US" sz="1800" dirty="0" smtClean="0">
+              <a:rPr lang="en-US" sz="1800" dirty="0">
                 <a:solidFill>
                   <a:srgbClr val="008000"/>
                 </a:solidFill>
@@ -6464,266 +6339,195 @@
               <a:t>good</a:t>
             </a:r>
             <a:r>
-              <a:rPr lang="en-US" sz="1800" dirty="0" smtClean="0">
+              <a:rPr lang="en-US" sz="1800" dirty="0">
                 <a:latin typeface="Arial" pitchFamily="34" charset="0"/>
                 <a:cs typeface="Arial" pitchFamily="34" charset="0"/>
               </a:rPr>
               <a:t> one. Your answer must be a value from 0% to 100%. </a:t>
             </a:r>
+          </a:p>
+          <a:p>
+            <a:pPr marL="0" indent="0">
+              <a:buNone/>
+            </a:pPr>
+            <a:r>
+              <a:rPr lang="en-US" sz="1800" dirty="0">
+                <a:latin typeface="Arial" pitchFamily="34" charset="0"/>
+                <a:cs typeface="Arial" pitchFamily="34" charset="0"/>
+              </a:rPr>
+              <a:t>*Remember that: </a:t>
+            </a:r>
+          </a:p>
+          <a:p>
+            <a:pPr>
+              <a:buFontTx/>
+              <a:buChar char="-"/>
+            </a:pPr>
+            <a:r>
+              <a:rPr lang="en-US" sz="1800" dirty="0">
+                <a:latin typeface="Arial" pitchFamily="34" charset="0"/>
+                <a:cs typeface="Arial" pitchFamily="34" charset="0"/>
+              </a:rPr>
+              <a:t>In the GAIN condition, a </a:t>
+            </a:r>
+            <a:r>
+              <a:rPr lang="en-US" sz="1800" dirty="0">
+                <a:solidFill>
+                  <a:srgbClr val="008000"/>
+                </a:solidFill>
+                <a:latin typeface="Arial" pitchFamily="34" charset="0"/>
+                <a:cs typeface="Arial" pitchFamily="34" charset="0"/>
+              </a:rPr>
+              <a:t>good</a:t>
+            </a:r>
+            <a:r>
+              <a:rPr lang="en-US" sz="1800" dirty="0">
+                <a:latin typeface="Arial" pitchFamily="34" charset="0"/>
+                <a:cs typeface="Arial" pitchFamily="34" charset="0"/>
+              </a:rPr>
+              <a:t> </a:t>
+            </a:r>
+            <a:r>
+              <a:rPr lang="en-US" sz="1800" b="1" dirty="0">
+                <a:latin typeface="Arial" pitchFamily="34" charset="0"/>
+                <a:cs typeface="Arial" pitchFamily="34" charset="0"/>
+              </a:rPr>
+              <a:t>stock</a:t>
+            </a:r>
+            <a:r>
+              <a:rPr lang="en-US" sz="1800" dirty="0">
+                <a:latin typeface="Arial" pitchFamily="34" charset="0"/>
+                <a:cs typeface="Arial" pitchFamily="34" charset="0"/>
+              </a:rPr>
+              <a:t> gives $10 payouts 70% of the time and $2 payouts 30% of the time.</a:t>
+            </a:r>
+          </a:p>
+          <a:p>
+            <a:pPr>
+              <a:buFontTx/>
+              <a:buChar char="-"/>
+            </a:pPr>
+            <a:r>
+              <a:rPr lang="en-US" sz="1800" dirty="0">
+                <a:latin typeface="Arial" pitchFamily="34" charset="0"/>
+                <a:cs typeface="Arial" pitchFamily="34" charset="0"/>
+              </a:rPr>
+              <a:t>In the LOSS condition, a </a:t>
+            </a:r>
+            <a:r>
+              <a:rPr lang="en-US" sz="1800" dirty="0">
+                <a:solidFill>
+                  <a:srgbClr val="008000"/>
+                </a:solidFill>
+                <a:latin typeface="Arial" pitchFamily="34" charset="0"/>
+                <a:cs typeface="Arial" pitchFamily="34" charset="0"/>
+              </a:rPr>
+              <a:t>good</a:t>
+            </a:r>
+            <a:r>
+              <a:rPr lang="en-US" sz="1800" dirty="0">
+                <a:latin typeface="Arial" pitchFamily="34" charset="0"/>
+                <a:cs typeface="Arial" pitchFamily="34" charset="0"/>
+              </a:rPr>
+              <a:t> </a:t>
+            </a:r>
+            <a:r>
+              <a:rPr lang="en-US" sz="1800" b="1" dirty="0">
+                <a:latin typeface="Arial" pitchFamily="34" charset="0"/>
+                <a:cs typeface="Arial" pitchFamily="34" charset="0"/>
+              </a:rPr>
+              <a:t>stock</a:t>
+            </a:r>
+            <a:r>
+              <a:rPr lang="en-US" sz="1800" dirty="0">
+                <a:latin typeface="Arial" pitchFamily="34" charset="0"/>
+                <a:cs typeface="Arial" pitchFamily="34" charset="0"/>
+              </a:rPr>
+              <a:t> gives -$2 payouts 70% of the time and -$10 payouts 30% of the time.</a:t>
+            </a:r>
+          </a:p>
+          <a:p>
+            <a:pPr marL="0" indent="0" algn="ctr">
+              <a:buNone/>
+            </a:pPr>
             <a:endParaRPr lang="en-US" sz="1800" dirty="0">
               <a:latin typeface="Arial" pitchFamily="34" charset="0"/>
               <a:cs typeface="Arial" pitchFamily="34" charset="0"/>
             </a:endParaRPr>
           </a:p>
           <a:p>
-            <a:pPr marL="0" indent="0">
+            <a:pPr marL="0" indent="0" algn="ctr">
               <a:buNone/>
             </a:pPr>
-            <a:r>
-              <a:rPr lang="en-US" sz="1800" dirty="0" smtClean="0">
-                <a:latin typeface="Arial" pitchFamily="34" charset="0"/>
-                <a:cs typeface="Arial" pitchFamily="34" charset="0"/>
-              </a:rPr>
-              <a:t>*Remember that: </a:t>
-            </a:r>
-          </a:p>
-          <a:p>
-            <a:pPr>
-              <a:buFontTx/>
-              <a:buChar char="-"/>
-            </a:pPr>
-            <a:r>
-              <a:rPr lang="en-US" sz="1800" dirty="0" smtClean="0">
-                <a:latin typeface="Arial" pitchFamily="34" charset="0"/>
-                <a:cs typeface="Arial" pitchFamily="34" charset="0"/>
-              </a:rPr>
-              <a:t>In the GAIN condition, a </a:t>
-            </a:r>
-            <a:r>
-              <a:rPr lang="en-US" sz="1800" dirty="0" smtClean="0">
-                <a:solidFill>
-                  <a:srgbClr val="008000"/>
-                </a:solidFill>
-                <a:latin typeface="Arial" pitchFamily="34" charset="0"/>
-                <a:cs typeface="Arial" pitchFamily="34" charset="0"/>
-              </a:rPr>
-              <a:t>good</a:t>
-            </a:r>
-            <a:r>
-              <a:rPr lang="en-US" sz="1800" dirty="0" smtClean="0">
-                <a:latin typeface="Arial" pitchFamily="34" charset="0"/>
-                <a:cs typeface="Arial" pitchFamily="34" charset="0"/>
-              </a:rPr>
-              <a:t> </a:t>
-            </a:r>
-            <a:r>
-              <a:rPr lang="en-US" sz="1800" b="1" dirty="0" smtClean="0">
-                <a:latin typeface="Arial" pitchFamily="34" charset="0"/>
-                <a:cs typeface="Arial" pitchFamily="34" charset="0"/>
-              </a:rPr>
-              <a:t>stock</a:t>
-            </a:r>
-            <a:r>
-              <a:rPr lang="en-US" sz="1800" dirty="0" smtClean="0">
-                <a:latin typeface="Arial" pitchFamily="34" charset="0"/>
-                <a:cs typeface="Arial" pitchFamily="34" charset="0"/>
-              </a:rPr>
-              <a:t> gives $10 payouts 70% of the time and $2 payouts 30% of the time.</a:t>
-            </a:r>
-          </a:p>
-          <a:p>
-            <a:pPr>
-              <a:buFontTx/>
-              <a:buChar char="-"/>
-            </a:pPr>
-            <a:r>
-              <a:rPr lang="en-US" sz="1800" dirty="0" smtClean="0">
-                <a:latin typeface="Arial" pitchFamily="34" charset="0"/>
-                <a:cs typeface="Arial" pitchFamily="34" charset="0"/>
-              </a:rPr>
-              <a:t>In the LOSS condition, a </a:t>
-            </a:r>
-            <a:r>
-              <a:rPr lang="en-US" sz="1800" dirty="0" smtClean="0">
-                <a:solidFill>
-                  <a:srgbClr val="008000"/>
-                </a:solidFill>
-                <a:latin typeface="Arial" pitchFamily="34" charset="0"/>
-                <a:cs typeface="Arial" pitchFamily="34" charset="0"/>
-              </a:rPr>
-              <a:t>good</a:t>
-            </a:r>
-            <a:r>
-              <a:rPr lang="en-US" sz="1800" dirty="0" smtClean="0">
-                <a:latin typeface="Arial" pitchFamily="34" charset="0"/>
-                <a:cs typeface="Arial" pitchFamily="34" charset="0"/>
-              </a:rPr>
-              <a:t> </a:t>
-            </a:r>
-            <a:r>
-              <a:rPr lang="en-US" sz="1800" b="1" dirty="0">
-                <a:latin typeface="Arial" pitchFamily="34" charset="0"/>
-                <a:cs typeface="Arial" pitchFamily="34" charset="0"/>
-              </a:rPr>
-              <a:t>stock</a:t>
-            </a:r>
-            <a:r>
-              <a:rPr lang="en-US" sz="1800" dirty="0">
-                <a:latin typeface="Arial" pitchFamily="34" charset="0"/>
-                <a:cs typeface="Arial" pitchFamily="34" charset="0"/>
-              </a:rPr>
-              <a:t> gives </a:t>
-            </a:r>
-            <a:r>
-              <a:rPr lang="en-US" sz="1800" dirty="0" smtClean="0">
-                <a:latin typeface="Arial" pitchFamily="34" charset="0"/>
-                <a:cs typeface="Arial" pitchFamily="34" charset="0"/>
-              </a:rPr>
-              <a:t>-$2 </a:t>
-            </a:r>
-            <a:r>
-              <a:rPr lang="en-US" sz="1800" dirty="0">
-                <a:latin typeface="Arial" pitchFamily="34" charset="0"/>
-                <a:cs typeface="Arial" pitchFamily="34" charset="0"/>
-              </a:rPr>
-              <a:t>payouts 70% of the time and </a:t>
-            </a:r>
-            <a:r>
-              <a:rPr lang="en-US" sz="1800" dirty="0" smtClean="0">
-                <a:latin typeface="Arial" pitchFamily="34" charset="0"/>
-                <a:cs typeface="Arial" pitchFamily="34" charset="0"/>
-              </a:rPr>
-              <a:t>-$10 </a:t>
-            </a:r>
-            <a:r>
-              <a:rPr lang="en-US" sz="1800" dirty="0">
-                <a:latin typeface="Arial" pitchFamily="34" charset="0"/>
-                <a:cs typeface="Arial" pitchFamily="34" charset="0"/>
-              </a:rPr>
-              <a:t>payouts 30% of the </a:t>
-            </a:r>
-            <a:r>
-              <a:rPr lang="en-US" sz="1800" dirty="0" smtClean="0">
-                <a:latin typeface="Arial" pitchFamily="34" charset="0"/>
-                <a:cs typeface="Arial" pitchFamily="34" charset="0"/>
-              </a:rPr>
-              <a:t>time.</a:t>
-            </a:r>
-          </a:p>
-          <a:p>
-            <a:pPr marL="0" indent="0" algn="ctr">
-              <a:buNone/>
-            </a:pPr>
-            <a:endParaRPr lang="en-US" sz="1800" dirty="0" smtClean="0">
-              <a:latin typeface="Arial" pitchFamily="34" charset="0"/>
-              <a:cs typeface="Arial" pitchFamily="34" charset="0"/>
-            </a:endParaRPr>
-          </a:p>
-          <a:p>
-            <a:pPr marL="0" indent="0" algn="ctr">
-              <a:buNone/>
-            </a:pPr>
-            <a:endParaRPr lang="en-US" sz="1800" dirty="0" smtClean="0">
-              <a:latin typeface="Arial" pitchFamily="34" charset="0"/>
-              <a:cs typeface="Arial" pitchFamily="34" charset="0"/>
-            </a:endParaRPr>
-          </a:p>
-          <a:p>
-            <a:pPr marL="0" indent="0" algn="ctr">
-              <a:buNone/>
-            </a:pPr>
-            <a:endParaRPr lang="en-US" sz="1800" dirty="0" smtClean="0">
-              <a:latin typeface="Arial" pitchFamily="34" charset="0"/>
-              <a:cs typeface="Arial" pitchFamily="34" charset="0"/>
-            </a:endParaRPr>
-          </a:p>
-          <a:p>
-            <a:pPr marL="0" indent="0" algn="ctr">
-              <a:buNone/>
-            </a:pPr>
-            <a:r>
-              <a:rPr lang="en-US" sz="1800" dirty="0" smtClean="0">
-                <a:latin typeface="Arial" pitchFamily="34" charset="0"/>
-                <a:cs typeface="Arial" pitchFamily="34" charset="0"/>
-              </a:rPr>
-              <a:t>Estimation Confidence Phase</a:t>
-            </a:r>
-          </a:p>
-          <a:p>
-            <a:pPr marL="0" indent="0">
-              <a:buNone/>
-            </a:pPr>
-            <a:r>
-              <a:rPr lang="en-US" sz="1800" dirty="0" smtClean="0">
-                <a:latin typeface="Arial" pitchFamily="34" charset="0"/>
-                <a:cs typeface="Arial" pitchFamily="34" charset="0"/>
-              </a:rPr>
-              <a:t>Finally, we want to know how much you trust your ability to come up with the correct probability estimate that the </a:t>
-            </a:r>
-            <a:r>
-              <a:rPr lang="en-US" sz="1800" b="1" dirty="0" smtClean="0">
-                <a:latin typeface="Arial" pitchFamily="34" charset="0"/>
-                <a:cs typeface="Arial" pitchFamily="34" charset="0"/>
-              </a:rPr>
-              <a:t>stock</a:t>
-            </a:r>
-            <a:r>
-              <a:rPr lang="en-US" sz="1800" dirty="0" smtClean="0">
-                <a:latin typeface="Arial" pitchFamily="34" charset="0"/>
-                <a:cs typeface="Arial" pitchFamily="34" charset="0"/>
-              </a:rPr>
-              <a:t> is </a:t>
-            </a:r>
-            <a:r>
-              <a:rPr lang="en-US" sz="1800" dirty="0" smtClean="0">
-                <a:solidFill>
-                  <a:srgbClr val="008000"/>
-                </a:solidFill>
-                <a:latin typeface="Arial" pitchFamily="34" charset="0"/>
-                <a:cs typeface="Arial" pitchFamily="34" charset="0"/>
-              </a:rPr>
-              <a:t>good</a:t>
-            </a:r>
-            <a:r>
-              <a:rPr lang="en-US" sz="1800" dirty="0" smtClean="0">
-                <a:latin typeface="Arial" pitchFamily="34" charset="0"/>
-                <a:cs typeface="Arial" pitchFamily="34" charset="0"/>
-              </a:rPr>
-              <a:t>. In other words, we want to know how confident you are that the probability you estimated is correct. </a:t>
-            </a:r>
-            <a:r>
-              <a:rPr lang="en-US" sz="1800" dirty="0">
-                <a:latin typeface="Arial" pitchFamily="34" charset="0"/>
-                <a:cs typeface="Arial" pitchFamily="34" charset="0"/>
-              </a:rPr>
-              <a:t>You’ll be asked to make a confidence rating on a 1-to-9 </a:t>
-            </a:r>
-            <a:r>
-              <a:rPr lang="en-US" sz="1800" dirty="0" smtClean="0">
-                <a:latin typeface="Arial" pitchFamily="34" charset="0"/>
-                <a:cs typeface="Arial" pitchFamily="34" charset="0"/>
-              </a:rPr>
-              <a:t>scale</a:t>
-            </a:r>
-            <a:r>
-              <a:rPr lang="en-US" sz="1800" dirty="0">
-                <a:latin typeface="Arial" pitchFamily="34" charset="0"/>
-                <a:cs typeface="Arial" pitchFamily="34" charset="0"/>
-              </a:rPr>
-              <a:t> </a:t>
-            </a:r>
-            <a:r>
-              <a:rPr lang="en-US" sz="1800" dirty="0" smtClean="0">
-                <a:latin typeface="Arial" pitchFamily="34" charset="0"/>
-                <a:cs typeface="Arial" pitchFamily="34" charset="0"/>
-              </a:rPr>
-              <a:t>(1=lowest confidence, 9=highest confidence). </a:t>
-            </a:r>
             <a:endParaRPr lang="en-US" sz="1800" dirty="0">
               <a:latin typeface="Arial" pitchFamily="34" charset="0"/>
               <a:cs typeface="Arial" pitchFamily="34" charset="0"/>
             </a:endParaRPr>
           </a:p>
+          <a:p>
+            <a:pPr marL="0" indent="0" algn="ctr">
+              <a:buNone/>
+            </a:pPr>
+            <a:endParaRPr lang="en-US" sz="1800" dirty="0">
+              <a:latin typeface="Arial" pitchFamily="34" charset="0"/>
+              <a:cs typeface="Arial" pitchFamily="34" charset="0"/>
+            </a:endParaRPr>
+          </a:p>
+          <a:p>
+            <a:pPr marL="0" indent="0" algn="ctr">
+              <a:buNone/>
+            </a:pPr>
+            <a:r>
+              <a:rPr lang="en-US" sz="1800" dirty="0">
+                <a:latin typeface="Arial" pitchFamily="34" charset="0"/>
+                <a:cs typeface="Arial" pitchFamily="34" charset="0"/>
+              </a:rPr>
+              <a:t>Estimation Confidence Phase</a:t>
+            </a:r>
+          </a:p>
+          <a:p>
+            <a:pPr marL="0" indent="0">
+              <a:buNone/>
+            </a:pPr>
+            <a:r>
+              <a:rPr lang="en-US" sz="1800" dirty="0">
+                <a:latin typeface="Arial" pitchFamily="34" charset="0"/>
+                <a:cs typeface="Arial" pitchFamily="34" charset="0"/>
+              </a:rPr>
+              <a:t>Finally, we want to know how much you trust your ability to come up with the correct probability estimate that the </a:t>
+            </a:r>
+            <a:r>
+              <a:rPr lang="en-US" sz="1800" b="1" dirty="0">
+                <a:latin typeface="Arial" pitchFamily="34" charset="0"/>
+                <a:cs typeface="Arial" pitchFamily="34" charset="0"/>
+              </a:rPr>
+              <a:t>stock</a:t>
+            </a:r>
+            <a:r>
+              <a:rPr lang="en-US" sz="1800" dirty="0">
+                <a:latin typeface="Arial" pitchFamily="34" charset="0"/>
+                <a:cs typeface="Arial" pitchFamily="34" charset="0"/>
+              </a:rPr>
+              <a:t> is </a:t>
+            </a:r>
+            <a:r>
+              <a:rPr lang="en-US" sz="1800" dirty="0">
+                <a:solidFill>
+                  <a:srgbClr val="008000"/>
+                </a:solidFill>
+                <a:latin typeface="Arial" pitchFamily="34" charset="0"/>
+                <a:cs typeface="Arial" pitchFamily="34" charset="0"/>
+              </a:rPr>
+              <a:t>good</a:t>
+            </a:r>
+            <a:r>
+              <a:rPr lang="en-US" sz="1800" dirty="0">
+                <a:latin typeface="Arial" pitchFamily="34" charset="0"/>
+                <a:cs typeface="Arial" pitchFamily="34" charset="0"/>
+              </a:rPr>
+              <a:t>. In other words, we want to know how confident you are that the probability you estimated is correct. You’ll be asked to make a confidence rating on a 1-to-9 scale (1=lowest confidence, 9=highest confidence). </a:t>
+            </a:r>
+          </a:p>
         </p:txBody>
       </p:sp>
       <p:sp>
@@ -6750,10 +6554,9 @@
           <a:p>
             <a:pPr algn="ctr"/>
             <a:r>
-              <a:rPr lang="en-US" dirty="0" smtClean="0"/>
+              <a:rPr lang="en-US" dirty="0"/>
               <a:t>- space bar to continue - </a:t>
             </a:r>
-            <a:endParaRPr lang="en-US" dirty="0"/>
           </a:p>
         </p:txBody>
       </p:sp>
@@ -6804,10 +6607,9 @@
           <a:lstStyle/>
           <a:p>
             <a:r>
-              <a:rPr lang="en-US" dirty="0" smtClean="0"/>
+              <a:rPr lang="en-US" dirty="0"/>
               <a:t>Example </a:t>
             </a:r>
-            <a:endParaRPr lang="en-US" dirty="0"/>
           </a:p>
         </p:txBody>
       </p:sp>
@@ -6879,10 +6681,9 @@
           <a:lstStyle/>
           <a:p>
             <a:r>
-              <a:rPr lang="en-US" dirty="0" smtClean="0"/>
+              <a:rPr lang="en-US" dirty="0"/>
               <a:t>Example </a:t>
             </a:r>
-            <a:endParaRPr lang="en-US" dirty="0"/>
           </a:p>
         </p:txBody>
       </p:sp>

</xml_diff>